<commit_message>
Comandos basicos para configuración global de GIT
Comandos basicos para configuración global de GIT
</commit_message>
<xml_diff>
--- a/Programacion/GIT/GIT - Control Versiones.pptx
+++ b/Programacion/GIT/GIT - Control Versiones.pptx
@@ -5,26 +5,27 @@
     <p:sldMasterId id="2147483648" r:id="rId1"/>
   </p:sldMasterIdLst>
   <p:notesMasterIdLst>
-    <p:notesMasterId r:id="rId16"/>
+    <p:notesMasterId r:id="rId17"/>
   </p:notesMasterIdLst>
   <p:handoutMasterIdLst>
-    <p:handoutMasterId r:id="rId17"/>
+    <p:handoutMasterId r:id="rId18"/>
   </p:handoutMasterIdLst>
   <p:sldIdLst>
     <p:sldId id="256" r:id="rId2"/>
     <p:sldId id="273" r:id="rId3"/>
     <p:sldId id="267" r:id="rId4"/>
     <p:sldId id="275" r:id="rId5"/>
-    <p:sldId id="274" r:id="rId6"/>
-    <p:sldId id="268" r:id="rId7"/>
-    <p:sldId id="269" r:id="rId8"/>
-    <p:sldId id="271" r:id="rId9"/>
-    <p:sldId id="258" r:id="rId10"/>
-    <p:sldId id="260" r:id="rId11"/>
-    <p:sldId id="261" r:id="rId12"/>
-    <p:sldId id="262" r:id="rId13"/>
-    <p:sldId id="272" r:id="rId14"/>
-    <p:sldId id="264" r:id="rId15"/>
+    <p:sldId id="276" r:id="rId6"/>
+    <p:sldId id="274" r:id="rId7"/>
+    <p:sldId id="268" r:id="rId8"/>
+    <p:sldId id="269" r:id="rId9"/>
+    <p:sldId id="271" r:id="rId10"/>
+    <p:sldId id="258" r:id="rId11"/>
+    <p:sldId id="260" r:id="rId12"/>
+    <p:sldId id="261" r:id="rId13"/>
+    <p:sldId id="262" r:id="rId14"/>
+    <p:sldId id="272" r:id="rId15"/>
+    <p:sldId id="264" r:id="rId16"/>
   </p:sldIdLst>
   <p:sldSz cx="12188825" cy="6858000"/>
   <p:notesSz cx="6858000" cy="9144000"/>
@@ -4387,7 +4388,7 @@
             <a:pPr rtl="0"/>
             <a:fld id="{69BBBD98-8689-4A62-BBFB-92BF328A7966}" type="datetime1">
               <a:rPr lang="es-ES" smtClean="0"/>
-              <a:t>22/12/2022</a:t>
+              <a:t>25/12/2022</a:t>
             </a:fld>
             <a:endParaRPr lang="es-ES" dirty="0"/>
           </a:p>
@@ -4565,7 +4566,7 @@
             <a:pPr rtl="0"/>
             <a:fld id="{8E41AB9B-16BF-4ECF-B92C-3E61E5BECA90}" type="datetime1">
               <a:rPr lang="es-ES" noProof="0" smtClean="0"/>
-              <a:t>22/12/2022</a:t>
+              <a:t>25/12/2022</a:t>
             </a:fld>
             <a:endParaRPr lang="es-ES" noProof="0" dirty="0"/>
           </a:p>
@@ -5007,7 +5008,7 @@
     </p:spTree>
     <p:extLst>
       <p:ext uri="{BB962C8B-B14F-4D97-AF65-F5344CB8AC3E}">
-        <p14:creationId xmlns:p14="http://schemas.microsoft.com/office/powerpoint/2010/main" val="569135123"/>
+        <p14:creationId xmlns:p14="http://schemas.microsoft.com/office/powerpoint/2010/main" val="51468493"/>
       </p:ext>
     </p:extLst>
   </p:cSld>
@@ -5093,7 +5094,7 @@
     </p:spTree>
     <p:extLst>
       <p:ext uri="{BB962C8B-B14F-4D97-AF65-F5344CB8AC3E}">
-        <p14:creationId xmlns:p14="http://schemas.microsoft.com/office/powerpoint/2010/main" val="1841258042"/>
+        <p14:creationId xmlns:p14="http://schemas.microsoft.com/office/powerpoint/2010/main" val="569135123"/>
       </p:ext>
     </p:extLst>
   </p:cSld>
@@ -5179,7 +5180,7 @@
     </p:spTree>
     <p:extLst>
       <p:ext uri="{BB962C8B-B14F-4D97-AF65-F5344CB8AC3E}">
-        <p14:creationId xmlns:p14="http://schemas.microsoft.com/office/powerpoint/2010/main" val="1399428138"/>
+        <p14:creationId xmlns:p14="http://schemas.microsoft.com/office/powerpoint/2010/main" val="1841258042"/>
       </p:ext>
     </p:extLst>
   </p:cSld>
@@ -5265,7 +5266,7 @@
     </p:spTree>
     <p:extLst>
       <p:ext uri="{BB962C8B-B14F-4D97-AF65-F5344CB8AC3E}">
-        <p14:creationId xmlns:p14="http://schemas.microsoft.com/office/powerpoint/2010/main" val="368498654"/>
+        <p14:creationId xmlns:p14="http://schemas.microsoft.com/office/powerpoint/2010/main" val="1399428138"/>
       </p:ext>
     </p:extLst>
   </p:cSld>
@@ -5343,6 +5344,92 @@
               <a:rPr lang="es-ES" smtClean="0"/>
               <a:pPr rtl="0"/>
               <a:t>14</a:t>
+            </a:fld>
+            <a:endParaRPr lang="es-ES" dirty="0"/>
+          </a:p>
+        </p:txBody>
+      </p:sp>
+    </p:spTree>
+    <p:extLst>
+      <p:ext uri="{BB962C8B-B14F-4D97-AF65-F5344CB8AC3E}">
+        <p14:creationId xmlns:p14="http://schemas.microsoft.com/office/powerpoint/2010/main" val="368498654"/>
+      </p:ext>
+    </p:extLst>
+  </p:cSld>
+  <p:clrMapOvr>
+    <a:masterClrMapping/>
+  </p:clrMapOvr>
+</p:notes>
+</file>
+
+<file path=ppt/notesSlides/notesSlide15.xml><?xml version="1.0" encoding="utf-8"?>
+<p:notes xmlns:a="http://schemas.openxmlformats.org/drawingml/2006/main" xmlns:r="http://schemas.openxmlformats.org/officeDocument/2006/relationships" xmlns:p="http://schemas.openxmlformats.org/presentationml/2006/main">
+  <p:cSld>
+    <p:spTree>
+      <p:nvGrpSpPr>
+        <p:cNvPr id="1" name=""/>
+        <p:cNvGrpSpPr/>
+        <p:nvPr/>
+      </p:nvGrpSpPr>
+      <p:grpSpPr>
+        <a:xfrm>
+          <a:off x="0" y="0"/>
+          <a:ext cx="0" cy="0"/>
+          <a:chOff x="0" y="0"/>
+          <a:chExt cx="0" cy="0"/>
+        </a:xfrm>
+      </p:grpSpPr>
+      <p:sp>
+        <p:nvSpPr>
+          <p:cNvPr id="2" name="Marcador de imagen de diapositiva 1"/>
+          <p:cNvSpPr>
+            <a:spLocks noGrp="1" noRot="1" noChangeAspect="1"/>
+          </p:cNvSpPr>
+          <p:nvPr>
+            <p:ph type="sldImg"/>
+          </p:nvPr>
+        </p:nvSpPr>
+        <p:spPr/>
+      </p:sp>
+      <p:sp>
+        <p:nvSpPr>
+          <p:cNvPr id="3" name="Marcador de notas 2"/>
+          <p:cNvSpPr>
+            <a:spLocks noGrp="1"/>
+          </p:cNvSpPr>
+          <p:nvPr>
+            <p:ph type="body" idx="1"/>
+          </p:nvPr>
+        </p:nvSpPr>
+        <p:spPr/>
+        <p:txBody>
+          <a:bodyPr/>
+          <a:lstStyle/>
+          <a:p>
+            <a:endParaRPr lang="es-ES" dirty="0"/>
+          </a:p>
+        </p:txBody>
+      </p:sp>
+      <p:sp>
+        <p:nvSpPr>
+          <p:cNvPr id="4" name="Marcador de número de diapositiva 3"/>
+          <p:cNvSpPr>
+            <a:spLocks noGrp="1"/>
+          </p:cNvSpPr>
+          <p:nvPr>
+            <p:ph type="sldNum" sz="quarter" idx="10"/>
+          </p:nvPr>
+        </p:nvSpPr>
+        <p:spPr/>
+        <p:txBody>
+          <a:bodyPr/>
+          <a:lstStyle/>
+          <a:p>
+            <a:pPr rtl="0"/>
+            <a:fld id="{841221E5-7225-48EB-A4EE-420E7BFCF705}" type="slidenum">
+              <a:rPr lang="es-ES" smtClean="0"/>
+              <a:pPr rtl="0"/>
+              <a:t>15</a:t>
             </a:fld>
             <a:endParaRPr lang="es-ES" dirty="0"/>
           </a:p>
@@ -5695,7 +5782,7 @@
     </p:spTree>
     <p:extLst>
       <p:ext uri="{BB962C8B-B14F-4D97-AF65-F5344CB8AC3E}">
-        <p14:creationId xmlns:p14="http://schemas.microsoft.com/office/powerpoint/2010/main" val="1952920916"/>
+        <p14:creationId xmlns:p14="http://schemas.microsoft.com/office/powerpoint/2010/main" val="1408898778"/>
       </p:ext>
     </p:extLst>
   </p:cSld>
@@ -5781,7 +5868,7 @@
     </p:spTree>
     <p:extLst>
       <p:ext uri="{BB962C8B-B14F-4D97-AF65-F5344CB8AC3E}">
-        <p14:creationId xmlns:p14="http://schemas.microsoft.com/office/powerpoint/2010/main" val="472929191"/>
+        <p14:creationId xmlns:p14="http://schemas.microsoft.com/office/powerpoint/2010/main" val="1952920916"/>
       </p:ext>
     </p:extLst>
   </p:cSld>
@@ -5867,7 +5954,7 @@
     </p:spTree>
     <p:extLst>
       <p:ext uri="{BB962C8B-B14F-4D97-AF65-F5344CB8AC3E}">
-        <p14:creationId xmlns:p14="http://schemas.microsoft.com/office/powerpoint/2010/main" val="1654880986"/>
+        <p14:creationId xmlns:p14="http://schemas.microsoft.com/office/powerpoint/2010/main" val="472929191"/>
       </p:ext>
     </p:extLst>
   </p:cSld>
@@ -5953,7 +6040,7 @@
     </p:spTree>
     <p:extLst>
       <p:ext uri="{BB962C8B-B14F-4D97-AF65-F5344CB8AC3E}">
-        <p14:creationId xmlns:p14="http://schemas.microsoft.com/office/powerpoint/2010/main" val="57769914"/>
+        <p14:creationId xmlns:p14="http://schemas.microsoft.com/office/powerpoint/2010/main" val="1654880986"/>
       </p:ext>
     </p:extLst>
   </p:cSld>
@@ -6039,7 +6126,7 @@
     </p:spTree>
     <p:extLst>
       <p:ext uri="{BB962C8B-B14F-4D97-AF65-F5344CB8AC3E}">
-        <p14:creationId xmlns:p14="http://schemas.microsoft.com/office/powerpoint/2010/main" val="51468493"/>
+        <p14:creationId xmlns:p14="http://schemas.microsoft.com/office/powerpoint/2010/main" val="57769914"/>
       </p:ext>
     </p:extLst>
   </p:cSld>
@@ -6770,7 +6857,6 @@
               <a:schemeClr val="bg1"/>
             </a:solidFill>
           </a:ln>
-          <a:extLst/>
         </p:spPr>
         <p:txBody>
           <a:bodyPr vert="horz" wrap="square" lIns="121899" tIns="60949" rIns="121899" bIns="60949" numCol="1" rtlCol="0" anchor="t" anchorCtr="0" compatLnSpc="1">
@@ -6969,7 +7055,7 @@
             <a:pPr rtl="0"/>
             <a:fld id="{D227DDB9-0E5E-4C56-81E2-42C38C100EB8}" type="datetime1">
               <a:rPr lang="es-ES" noProof="0" smtClean="0"/>
-              <a:t>22/12/2022</a:t>
+              <a:t>25/12/2022</a:t>
             </a:fld>
             <a:endParaRPr lang="es-ES" noProof="0" dirty="0"/>
           </a:p>
@@ -7196,7 +7282,7 @@
             <a:pPr rtl="0"/>
             <a:fld id="{854D34C8-6636-436D-90B3-E45C17BC29D1}" type="datetime1">
               <a:rPr lang="es-ES" noProof="0" smtClean="0"/>
-              <a:t>22/12/2022</a:t>
+              <a:t>25/12/2022</a:t>
             </a:fld>
             <a:endParaRPr lang="es-ES" noProof="0" dirty="0"/>
           </a:p>
@@ -7865,7 +7951,6 @@
           <a:ln>
             <a:noFill/>
           </a:ln>
-          <a:extLst/>
         </p:spPr>
         <p:txBody>
           <a:bodyPr vert="horz" wrap="square" lIns="91440" tIns="45720" rIns="91440" bIns="45720" numCol="1" rtlCol="0" anchor="t" anchorCtr="0" compatLnSpc="1">
@@ -8019,7 +8104,7 @@
             <a:pPr rtl="0"/>
             <a:fld id="{5B1A7055-A05B-47D6-9397-3E4A1BE71239}" type="datetime1">
               <a:rPr lang="es-ES" noProof="0" smtClean="0"/>
-              <a:t>22/12/2022</a:t>
+              <a:t>25/12/2022</a:t>
             </a:fld>
             <a:endParaRPr lang="es-ES" noProof="0" dirty="0"/>
           </a:p>
@@ -8224,7 +8309,7 @@
             <a:pPr rtl="0"/>
             <a:fld id="{397066DD-333B-4949-A479-115F2B9E08E7}" type="datetime1">
               <a:rPr lang="es-ES" noProof="0" smtClean="0"/>
-              <a:t>22/12/2022</a:t>
+              <a:t>25/12/2022</a:t>
             </a:fld>
             <a:endParaRPr lang="es-ES" noProof="0" dirty="0"/>
           </a:p>
@@ -9802,7 +9887,7 @@
             <a:pPr rtl="0"/>
             <a:fld id="{2C913CB4-D4A9-4FBE-913D-B9E890ABEF3F}" type="datetime1">
               <a:rPr lang="es-ES" noProof="0" smtClean="0"/>
-              <a:t>22/12/2022</a:t>
+              <a:t>25/12/2022</a:t>
             </a:fld>
             <a:endParaRPr lang="es-ES" noProof="0" dirty="0"/>
           </a:p>
@@ -9939,7 +10024,7 @@
             <a:pPr rtl="0"/>
             <a:fld id="{543DE88F-8DA3-44F9-868D-559DD495EADB}" type="datetime1">
               <a:rPr lang="es-ES" noProof="0" smtClean="0"/>
-              <a:t>22/12/2022</a:t>
+              <a:t>25/12/2022</a:t>
             </a:fld>
             <a:endParaRPr lang="es-ES" noProof="0" dirty="0"/>
           </a:p>
@@ -10280,7 +10365,7 @@
             <a:pPr rtl="0"/>
             <a:fld id="{C7A9AAEF-0AD3-419E-B51F-A77C6A89DFB2}" type="datetime1">
               <a:rPr lang="es-ES" noProof="0" smtClean="0"/>
-              <a:t>22/12/2022</a:t>
+              <a:t>25/12/2022</a:t>
             </a:fld>
             <a:endParaRPr lang="es-ES" noProof="0" dirty="0"/>
           </a:p>
@@ -10779,7 +10864,7 @@
             <a:pPr rtl="0"/>
             <a:fld id="{C31318DA-4832-4504-A64F-05EF187BF5DA}" type="datetime1">
               <a:rPr lang="es-ES" noProof="0" smtClean="0"/>
-              <a:t>22/12/2022</a:t>
+              <a:t>25/12/2022</a:t>
             </a:fld>
             <a:endParaRPr lang="es-ES" noProof="0" dirty="0"/>
           </a:p>
@@ -11235,7 +11320,7 @@
             <a:pPr rtl="0"/>
             <a:fld id="{A361280F-B7E7-4174-BE87-9E37B5A43C49}" type="datetime1">
               <a:rPr lang="es-ES" noProof="0" smtClean="0"/>
-              <a:t>22/12/2022</a:t>
+              <a:t>25/12/2022</a:t>
             </a:fld>
             <a:endParaRPr lang="es-ES" noProof="0" dirty="0"/>
           </a:p>
@@ -11961,7 +12046,6 @@
           <a:ln>
             <a:noFill/>
           </a:ln>
-          <a:extLst/>
         </p:spPr>
         <p:txBody>
           <a:bodyPr vert="horz" wrap="square" lIns="91440" tIns="45720" rIns="91440" bIns="45720" numCol="1" rtlCol="0" anchor="t" anchorCtr="0" compatLnSpc="1">
@@ -12139,7 +12223,7 @@
             <a:pPr rtl="0"/>
             <a:fld id="{3FB7BB0F-7041-4735-B07A-25DB00AC6E71}" type="datetime1">
               <a:rPr lang="es-ES" noProof="0" smtClean="0"/>
-              <a:t>22/12/2022</a:t>
+              <a:t>25/12/2022</a:t>
             </a:fld>
             <a:endParaRPr lang="es-ES" noProof="0" dirty="0"/>
           </a:p>
@@ -12541,7 +12625,7 @@
       </a:lvl9pPr>
     </p:otherStyle>
   </p:txStyles>
-  <p:extLst mod="1">
+  <p:extLst>
     <p:ext uri="{27BBF7A9-308A-43DC-89C8-2F10F3537804}">
       <p15:sldGuideLst xmlns:p15="http://schemas.microsoft.com/office/powerpoint/2012/main">
         <p15:guide id="1" orient="horz" pos="2160" userDrawn="1">
@@ -12707,14 +12791,14 @@
             <a:pPr rtl="0"/>
             <a:r>
               <a:rPr lang="es-ES" dirty="0"/>
-              <a:t>Agregar un título de diapositiva (2)</a:t>
+              <a:t>Agregar un título de diapositiva (1)</a:t>
             </a:r>
           </a:p>
         </p:txBody>
       </p:sp>
       <p:sp>
         <p:nvSpPr>
-          <p:cNvPr id="4" name="Marcador de posición de texto 3"/>
+          <p:cNvPr id="5" name="Marcador de posición de texto 4"/>
           <p:cNvSpPr>
             <a:spLocks noGrp="1"/>
           </p:cNvSpPr>
@@ -12734,70 +12818,10 @@
       </p:sp>
       <p:sp>
         <p:nvSpPr>
-          <p:cNvPr id="5" name="Marcador de posición de contenido 4"/>
-          <p:cNvSpPr>
-            <a:spLocks noGrp="1"/>
-          </p:cNvSpPr>
-          <p:nvPr>
-            <p:ph sz="half" idx="2"/>
-          </p:nvPr>
-        </p:nvSpPr>
-        <p:spPr/>
-        <p:txBody>
-          <a:bodyPr rtlCol="0"/>
-          <a:lstStyle/>
-          <a:p>
-            <a:pPr rtl="0"/>
-            <a:endParaRPr lang="es-ES" dirty="0"/>
-          </a:p>
-        </p:txBody>
-      </p:sp>
-      <p:sp>
-        <p:nvSpPr>
-          <p:cNvPr id="6" name="Marcador de posición de texto 5"/>
-          <p:cNvSpPr>
-            <a:spLocks noGrp="1"/>
-          </p:cNvSpPr>
-          <p:nvPr>
-            <p:ph type="body" sz="quarter" idx="3"/>
-          </p:nvPr>
-        </p:nvSpPr>
-        <p:spPr/>
-        <p:txBody>
-          <a:bodyPr rtlCol="0"/>
-          <a:lstStyle/>
-          <a:p>
-            <a:pPr rtl="0"/>
-            <a:endParaRPr lang="es-ES" dirty="0"/>
-          </a:p>
-        </p:txBody>
-      </p:sp>
-      <p:sp>
-        <p:nvSpPr>
-          <p:cNvPr id="11" name="Marcador de posición de contenido 10"/>
-          <p:cNvSpPr>
-            <a:spLocks noGrp="1"/>
-          </p:cNvSpPr>
-          <p:nvPr>
-            <p:ph sz="quarter" idx="4"/>
-          </p:nvPr>
-        </p:nvSpPr>
-        <p:spPr/>
-        <p:txBody>
-          <a:bodyPr rtlCol="0"/>
-          <a:lstStyle/>
-          <a:p>
-            <a:pPr rtl="0"/>
-            <a:endParaRPr lang="es-ES" dirty="0"/>
-          </a:p>
-        </p:txBody>
-      </p:sp>
-      <p:sp>
-        <p:nvSpPr>
           <p:cNvPr id="3" name="Marcador de pie de página 2">
             <a:extLst>
               <a:ext uri="{FF2B5EF4-FFF2-40B4-BE49-F238E27FC236}">
-                <a16:creationId xmlns:a16="http://schemas.microsoft.com/office/drawing/2014/main" id="{FB76CB50-1503-4000-8D3D-47FE31E61BC6}"/>
+                <a16:creationId xmlns:a16="http://schemas.microsoft.com/office/drawing/2014/main" id="{51A48A5E-C144-458C-902D-D0C3F769511E}"/>
               </a:ext>
             </a:extLst>
           </p:cNvPr>
@@ -12805,10 +12829,15 @@
             <a:spLocks noGrp="1"/>
           </p:cNvSpPr>
           <p:nvPr>
-            <p:ph type="ftr" sz="quarter" idx="11"/>
+            <p:ph type="ftr" sz="quarter" idx="4294967295"/>
           </p:nvPr>
         </p:nvSpPr>
-        <p:spPr/>
+        <p:spPr>
+          <a:xfrm>
+            <a:off x="6595933" y="6378799"/>
+            <a:ext cx="3974065" cy="365125"/>
+          </a:xfrm>
+        </p:spPr>
         <p:txBody>
           <a:bodyPr/>
           <a:lstStyle/>
@@ -12824,10 +12853,10 @@
       </p:sp>
       <p:sp>
         <p:nvSpPr>
-          <p:cNvPr id="7" name="Marcador de número de diapositiva 6">
+          <p:cNvPr id="4" name="Marcador de número de diapositiva 3">
             <a:extLst>
               <a:ext uri="{FF2B5EF4-FFF2-40B4-BE49-F238E27FC236}">
-                <a16:creationId xmlns:a16="http://schemas.microsoft.com/office/drawing/2014/main" id="{41DA4AFA-E518-472B-A834-5D4295BA6605}"/>
+                <a16:creationId xmlns:a16="http://schemas.microsoft.com/office/drawing/2014/main" id="{B883489B-C3C3-4CA7-ACA5-8594BFAFF488}"/>
               </a:ext>
             </a:extLst>
           </p:cNvPr>
@@ -12835,10 +12864,15 @@
             <a:spLocks noGrp="1"/>
           </p:cNvSpPr>
           <p:nvPr>
-            <p:ph type="sldNum" sz="quarter" idx="12"/>
+            <p:ph type="sldNum" sz="quarter" idx="4294967295"/>
           </p:nvPr>
         </p:nvSpPr>
-        <p:spPr/>
+        <p:spPr>
+          <a:xfrm>
+            <a:off x="10666571" y="6378799"/>
+            <a:ext cx="609441" cy="365125"/>
+          </a:xfrm>
+        </p:spPr>
         <p:txBody>
           <a:bodyPr/>
           <a:lstStyle/>
@@ -12846,6 +12880,7 @@
             <a:pPr rtl="0"/>
             <a:fld id="{7DC1BBB0-96F0-4077-A278-0F3FB5C104D3}" type="slidenum">
               <a:rPr lang="es-ES" noProof="0" smtClean="0"/>
+              <a:pPr rtl="0"/>
               <a:t>10</a:t>
             </a:fld>
             <a:endParaRPr lang="es-ES" noProof="0" dirty="0"/>
@@ -12855,7 +12890,7 @@
     </p:spTree>
     <p:extLst>
       <p:ext uri="{BB962C8B-B14F-4D97-AF65-F5344CB8AC3E}">
-        <p14:creationId xmlns:p14="http://schemas.microsoft.com/office/powerpoint/2010/main" val="1061194279"/>
+        <p14:creationId xmlns:p14="http://schemas.microsoft.com/office/powerpoint/2010/main" val="352090314"/>
       </p:ext>
     </p:extLst>
   </p:cSld>
@@ -12912,8 +12947,88 @@
             <a:pPr rtl="0"/>
             <a:r>
               <a:rPr lang="es-ES" dirty="0"/>
-              <a:t>Agregar un título de diapositiva (3)</a:t>
+              <a:t>Agregar un título de diapositiva (2)</a:t>
             </a:r>
+          </a:p>
+        </p:txBody>
+      </p:sp>
+      <p:sp>
+        <p:nvSpPr>
+          <p:cNvPr id="4" name="Marcador de posición de texto 3"/>
+          <p:cNvSpPr>
+            <a:spLocks noGrp="1"/>
+          </p:cNvSpPr>
+          <p:nvPr>
+            <p:ph type="body" idx="1"/>
+          </p:nvPr>
+        </p:nvSpPr>
+        <p:spPr/>
+        <p:txBody>
+          <a:bodyPr rtlCol="0"/>
+          <a:lstStyle/>
+          <a:p>
+            <a:pPr rtl="0"/>
+            <a:endParaRPr lang="es-ES" dirty="0"/>
+          </a:p>
+        </p:txBody>
+      </p:sp>
+      <p:sp>
+        <p:nvSpPr>
+          <p:cNvPr id="5" name="Marcador de posición de contenido 4"/>
+          <p:cNvSpPr>
+            <a:spLocks noGrp="1"/>
+          </p:cNvSpPr>
+          <p:nvPr>
+            <p:ph sz="half" idx="2"/>
+          </p:nvPr>
+        </p:nvSpPr>
+        <p:spPr/>
+        <p:txBody>
+          <a:bodyPr rtlCol="0"/>
+          <a:lstStyle/>
+          <a:p>
+            <a:pPr rtl="0"/>
+            <a:endParaRPr lang="es-ES" dirty="0"/>
+          </a:p>
+        </p:txBody>
+      </p:sp>
+      <p:sp>
+        <p:nvSpPr>
+          <p:cNvPr id="6" name="Marcador de posición de texto 5"/>
+          <p:cNvSpPr>
+            <a:spLocks noGrp="1"/>
+          </p:cNvSpPr>
+          <p:nvPr>
+            <p:ph type="body" sz="quarter" idx="3"/>
+          </p:nvPr>
+        </p:nvSpPr>
+        <p:spPr/>
+        <p:txBody>
+          <a:bodyPr rtlCol="0"/>
+          <a:lstStyle/>
+          <a:p>
+            <a:pPr rtl="0"/>
+            <a:endParaRPr lang="es-ES" dirty="0"/>
+          </a:p>
+        </p:txBody>
+      </p:sp>
+      <p:sp>
+        <p:nvSpPr>
+          <p:cNvPr id="11" name="Marcador de posición de contenido 10"/>
+          <p:cNvSpPr>
+            <a:spLocks noGrp="1"/>
+          </p:cNvSpPr>
+          <p:nvPr>
+            <p:ph sz="quarter" idx="4"/>
+          </p:nvPr>
+        </p:nvSpPr>
+        <p:spPr/>
+        <p:txBody>
+          <a:bodyPr rtlCol="0"/>
+          <a:lstStyle/>
+          <a:p>
+            <a:pPr rtl="0"/>
+            <a:endParaRPr lang="es-ES" dirty="0"/>
           </a:p>
         </p:txBody>
       </p:sp>
@@ -12922,7 +13037,7 @@
           <p:cNvPr id="3" name="Marcador de pie de página 2">
             <a:extLst>
               <a:ext uri="{FF2B5EF4-FFF2-40B4-BE49-F238E27FC236}">
-                <a16:creationId xmlns:a16="http://schemas.microsoft.com/office/drawing/2014/main" id="{605CF5B0-E3D8-4A73-B6A0-F474B11593A7}"/>
+                <a16:creationId xmlns:a16="http://schemas.microsoft.com/office/drawing/2014/main" id="{FB76CB50-1503-4000-8D3D-47FE31E61BC6}"/>
               </a:ext>
             </a:extLst>
           </p:cNvPr>
@@ -12949,10 +13064,10 @@
       </p:sp>
       <p:sp>
         <p:nvSpPr>
-          <p:cNvPr id="4" name="Marcador de número de diapositiva 3">
+          <p:cNvPr id="7" name="Marcador de número de diapositiva 6">
             <a:extLst>
               <a:ext uri="{FF2B5EF4-FFF2-40B4-BE49-F238E27FC236}">
-                <a16:creationId xmlns:a16="http://schemas.microsoft.com/office/drawing/2014/main" id="{B6383853-2D00-4E16-8AE5-C1B6B8DC5FE3}"/>
+                <a16:creationId xmlns:a16="http://schemas.microsoft.com/office/drawing/2014/main" id="{41DA4AFA-E518-472B-A834-5D4295BA6605}"/>
               </a:ext>
             </a:extLst>
           </p:cNvPr>
@@ -12980,7 +13095,7 @@
     </p:spTree>
     <p:extLst>
       <p:ext uri="{BB962C8B-B14F-4D97-AF65-F5344CB8AC3E}">
-        <p14:creationId xmlns:p14="http://schemas.microsoft.com/office/powerpoint/2010/main" val="3401786857"/>
+        <p14:creationId xmlns:p14="http://schemas.microsoft.com/office/powerpoint/2010/main" val="1061194279"/>
       </p:ext>
     </p:extLst>
   </p:cSld>
@@ -13021,10 +13136,33 @@
       </p:grpSpPr>
       <p:sp>
         <p:nvSpPr>
-          <p:cNvPr id="2" name="Marcador de pie de página 1">
+          <p:cNvPr id="2" name="Título 1"/>
+          <p:cNvSpPr>
+            <a:spLocks noGrp="1"/>
+          </p:cNvSpPr>
+          <p:nvPr>
+            <p:ph type="title"/>
+          </p:nvPr>
+        </p:nvSpPr>
+        <p:spPr/>
+        <p:txBody>
+          <a:bodyPr rtlCol="0"/>
+          <a:lstStyle/>
+          <a:p>
+            <a:pPr rtl="0"/>
+            <a:r>
+              <a:rPr lang="es-ES" dirty="0"/>
+              <a:t>Agregar un título de diapositiva (3)</a:t>
+            </a:r>
+          </a:p>
+        </p:txBody>
+      </p:sp>
+      <p:sp>
+        <p:nvSpPr>
+          <p:cNvPr id="3" name="Marcador de pie de página 2">
             <a:extLst>
               <a:ext uri="{FF2B5EF4-FFF2-40B4-BE49-F238E27FC236}">
-                <a16:creationId xmlns:a16="http://schemas.microsoft.com/office/drawing/2014/main" id="{7F42C0CF-13C4-4154-B2AB-C267BFC017E5}"/>
+                <a16:creationId xmlns:a16="http://schemas.microsoft.com/office/drawing/2014/main" id="{605CF5B0-E3D8-4A73-B6A0-F474B11593A7}"/>
               </a:ext>
             </a:extLst>
           </p:cNvPr>
@@ -13051,10 +13189,10 @@
       </p:sp>
       <p:sp>
         <p:nvSpPr>
-          <p:cNvPr id="3" name="Marcador de número de diapositiva 2">
+          <p:cNvPr id="4" name="Marcador de número de diapositiva 3">
             <a:extLst>
               <a:ext uri="{FF2B5EF4-FFF2-40B4-BE49-F238E27FC236}">
-                <a16:creationId xmlns:a16="http://schemas.microsoft.com/office/drawing/2014/main" id="{E1491466-AF14-4928-BFC8-9433024D6A7E}"/>
+                <a16:creationId xmlns:a16="http://schemas.microsoft.com/office/drawing/2014/main" id="{B6383853-2D00-4E16-8AE5-C1B6B8DC5FE3}"/>
               </a:ext>
             </a:extLst>
           </p:cNvPr>
@@ -13073,7 +13211,6 @@
             <a:pPr rtl="0"/>
             <a:fld id="{7DC1BBB0-96F0-4077-A278-0F3FB5C104D3}" type="slidenum">
               <a:rPr lang="es-ES" noProof="0" smtClean="0"/>
-              <a:pPr rtl="0"/>
               <a:t>12</a:t>
             </a:fld>
             <a:endParaRPr lang="es-ES" noProof="0" dirty="0"/>
@@ -13083,7 +13220,7 @@
     </p:spTree>
     <p:extLst>
       <p:ext uri="{BB962C8B-B14F-4D97-AF65-F5344CB8AC3E}">
-        <p14:creationId xmlns:p14="http://schemas.microsoft.com/office/powerpoint/2010/main" val="4022862849"/>
+        <p14:creationId xmlns:p14="http://schemas.microsoft.com/office/powerpoint/2010/main" val="3401786857"/>
       </p:ext>
     </p:extLst>
   </p:cSld>
@@ -13124,73 +13261,10 @@
       </p:grpSpPr>
       <p:sp>
         <p:nvSpPr>
-          <p:cNvPr id="2" name="Título 1"/>
-          <p:cNvSpPr>
-            <a:spLocks noGrp="1"/>
-          </p:cNvSpPr>
-          <p:nvPr>
-            <p:ph type="title"/>
-          </p:nvPr>
-        </p:nvSpPr>
-        <p:spPr/>
-        <p:txBody>
-          <a:bodyPr rtlCol="0"/>
-          <a:lstStyle/>
-          <a:p>
-            <a:pPr rtl="0"/>
-            <a:r>
-              <a:rPr lang="es-ES" dirty="0"/>
-              <a:t>Agregar un título de diapositiva (4)</a:t>
-            </a:r>
-          </a:p>
-        </p:txBody>
-      </p:sp>
-      <p:sp>
-        <p:nvSpPr>
-          <p:cNvPr id="4" name="Marcador de posición de contenido 3"/>
-          <p:cNvSpPr>
-            <a:spLocks noGrp="1"/>
-          </p:cNvSpPr>
-          <p:nvPr>
-            <p:ph idx="1"/>
-          </p:nvPr>
-        </p:nvSpPr>
-        <p:spPr/>
-        <p:txBody>
-          <a:bodyPr rtlCol="0"/>
-          <a:lstStyle/>
-          <a:p>
-            <a:pPr rtl="0"/>
-            <a:endParaRPr lang="es-ES" dirty="0"/>
-          </a:p>
-        </p:txBody>
-      </p:sp>
-      <p:sp>
-        <p:nvSpPr>
-          <p:cNvPr id="7" name="Marcador de posición de texto 6"/>
-          <p:cNvSpPr>
-            <a:spLocks noGrp="1"/>
-          </p:cNvSpPr>
-          <p:nvPr>
-            <p:ph type="body" sz="half" idx="2"/>
-          </p:nvPr>
-        </p:nvSpPr>
-        <p:spPr/>
-        <p:txBody>
-          <a:bodyPr rtlCol="0"/>
-          <a:lstStyle/>
-          <a:p>
-            <a:pPr rtl="0"/>
-            <a:endParaRPr lang="es-ES" dirty="0"/>
-          </a:p>
-        </p:txBody>
-      </p:sp>
-      <p:sp>
-        <p:nvSpPr>
-          <p:cNvPr id="3" name="Marcador de pie de página 2">
+          <p:cNvPr id="2" name="Marcador de pie de página 1">
             <a:extLst>
               <a:ext uri="{FF2B5EF4-FFF2-40B4-BE49-F238E27FC236}">
-                <a16:creationId xmlns:a16="http://schemas.microsoft.com/office/drawing/2014/main" id="{1B0A2556-12B2-42D6-BCC3-F811588323DF}"/>
+                <a16:creationId xmlns:a16="http://schemas.microsoft.com/office/drawing/2014/main" id="{7F42C0CF-13C4-4154-B2AB-C267BFC017E5}"/>
               </a:ext>
             </a:extLst>
           </p:cNvPr>
@@ -13217,10 +13291,10 @@
       </p:sp>
       <p:sp>
         <p:nvSpPr>
-          <p:cNvPr id="5" name="Marcador de número de diapositiva 4">
+          <p:cNvPr id="3" name="Marcador de número de diapositiva 2">
             <a:extLst>
               <a:ext uri="{FF2B5EF4-FFF2-40B4-BE49-F238E27FC236}">
-                <a16:creationId xmlns:a16="http://schemas.microsoft.com/office/drawing/2014/main" id="{F845EE72-4EF2-4A51-80A2-B71984092F2F}"/>
+                <a16:creationId xmlns:a16="http://schemas.microsoft.com/office/drawing/2014/main" id="{E1491466-AF14-4928-BFC8-9433024D6A7E}"/>
               </a:ext>
             </a:extLst>
           </p:cNvPr>
@@ -13239,6 +13313,7 @@
             <a:pPr rtl="0"/>
             <a:fld id="{7DC1BBB0-96F0-4077-A278-0F3FB5C104D3}" type="slidenum">
               <a:rPr lang="es-ES" noProof="0" smtClean="0"/>
+              <a:pPr rtl="0"/>
               <a:t>13</a:t>
             </a:fld>
             <a:endParaRPr lang="es-ES" noProof="0" dirty="0"/>
@@ -13248,7 +13323,7 @@
     </p:spTree>
     <p:extLst>
       <p:ext uri="{BB962C8B-B14F-4D97-AF65-F5344CB8AC3E}">
-        <p14:creationId xmlns:p14="http://schemas.microsoft.com/office/powerpoint/2010/main" val="3614150638"/>
+        <p14:creationId xmlns:p14="http://schemas.microsoft.com/office/powerpoint/2010/main" val="4022862849"/>
       </p:ext>
     </p:extLst>
   </p:cSld>
@@ -13305,6 +13380,171 @@
             <a:pPr rtl="0"/>
             <a:r>
               <a:rPr lang="es-ES" dirty="0"/>
+              <a:t>Agregar un título de diapositiva (4)</a:t>
+            </a:r>
+          </a:p>
+        </p:txBody>
+      </p:sp>
+      <p:sp>
+        <p:nvSpPr>
+          <p:cNvPr id="4" name="Marcador de posición de contenido 3"/>
+          <p:cNvSpPr>
+            <a:spLocks noGrp="1"/>
+          </p:cNvSpPr>
+          <p:nvPr>
+            <p:ph idx="1"/>
+          </p:nvPr>
+        </p:nvSpPr>
+        <p:spPr/>
+        <p:txBody>
+          <a:bodyPr rtlCol="0"/>
+          <a:lstStyle/>
+          <a:p>
+            <a:pPr rtl="0"/>
+            <a:endParaRPr lang="es-ES" dirty="0"/>
+          </a:p>
+        </p:txBody>
+      </p:sp>
+      <p:sp>
+        <p:nvSpPr>
+          <p:cNvPr id="7" name="Marcador de posición de texto 6"/>
+          <p:cNvSpPr>
+            <a:spLocks noGrp="1"/>
+          </p:cNvSpPr>
+          <p:nvPr>
+            <p:ph type="body" sz="half" idx="2"/>
+          </p:nvPr>
+        </p:nvSpPr>
+        <p:spPr/>
+        <p:txBody>
+          <a:bodyPr rtlCol="0"/>
+          <a:lstStyle/>
+          <a:p>
+            <a:pPr rtl="0"/>
+            <a:endParaRPr lang="es-ES" dirty="0"/>
+          </a:p>
+        </p:txBody>
+      </p:sp>
+      <p:sp>
+        <p:nvSpPr>
+          <p:cNvPr id="3" name="Marcador de pie de página 2">
+            <a:extLst>
+              <a:ext uri="{FF2B5EF4-FFF2-40B4-BE49-F238E27FC236}">
+                <a16:creationId xmlns:a16="http://schemas.microsoft.com/office/drawing/2014/main" id="{1B0A2556-12B2-42D6-BCC3-F811588323DF}"/>
+              </a:ext>
+            </a:extLst>
+          </p:cNvPr>
+          <p:cNvSpPr>
+            <a:spLocks noGrp="1"/>
+          </p:cNvSpPr>
+          <p:nvPr>
+            <p:ph type="ftr" sz="quarter" idx="11"/>
+          </p:nvPr>
+        </p:nvSpPr>
+        <p:spPr/>
+        <p:txBody>
+          <a:bodyPr/>
+          <a:lstStyle/>
+          <a:p>
+            <a:pPr rtl="0"/>
+            <a:r>
+              <a:rPr lang="es-ES" noProof="0"/>
+              <a:t>Agregar un pie de página</a:t>
+            </a:r>
+            <a:endParaRPr lang="es-ES" noProof="0" dirty="0"/>
+          </a:p>
+        </p:txBody>
+      </p:sp>
+      <p:sp>
+        <p:nvSpPr>
+          <p:cNvPr id="5" name="Marcador de número de diapositiva 4">
+            <a:extLst>
+              <a:ext uri="{FF2B5EF4-FFF2-40B4-BE49-F238E27FC236}">
+                <a16:creationId xmlns:a16="http://schemas.microsoft.com/office/drawing/2014/main" id="{F845EE72-4EF2-4A51-80A2-B71984092F2F}"/>
+              </a:ext>
+            </a:extLst>
+          </p:cNvPr>
+          <p:cNvSpPr>
+            <a:spLocks noGrp="1"/>
+          </p:cNvSpPr>
+          <p:nvPr>
+            <p:ph type="sldNum" sz="quarter" idx="12"/>
+          </p:nvPr>
+        </p:nvSpPr>
+        <p:spPr/>
+        <p:txBody>
+          <a:bodyPr/>
+          <a:lstStyle/>
+          <a:p>
+            <a:pPr rtl="0"/>
+            <a:fld id="{7DC1BBB0-96F0-4077-A278-0F3FB5C104D3}" type="slidenum">
+              <a:rPr lang="es-ES" noProof="0" smtClean="0"/>
+              <a:t>14</a:t>
+            </a:fld>
+            <a:endParaRPr lang="es-ES" noProof="0" dirty="0"/>
+          </a:p>
+        </p:txBody>
+      </p:sp>
+    </p:spTree>
+    <p:extLst>
+      <p:ext uri="{BB962C8B-B14F-4D97-AF65-F5344CB8AC3E}">
+        <p14:creationId xmlns:p14="http://schemas.microsoft.com/office/powerpoint/2010/main" val="3614150638"/>
+      </p:ext>
+    </p:extLst>
+  </p:cSld>
+  <p:clrMapOvr>
+    <a:masterClrMapping/>
+  </p:clrMapOvr>
+  <mc:AlternateContent xmlns:mc="http://schemas.openxmlformats.org/markup-compatibility/2006" xmlns:p14="http://schemas.microsoft.com/office/powerpoint/2010/main">
+    <mc:Choice Requires="p14">
+      <p:transition spd="med" p14:dur="700">
+        <p:fade/>
+      </p:transition>
+    </mc:Choice>
+    <mc:Fallback xmlns="">
+      <p:transition spd="med">
+        <p:fade/>
+      </p:transition>
+    </mc:Fallback>
+  </mc:AlternateContent>
+</p:sld>
+</file>
+
+<file path=ppt/slides/slide15.xml><?xml version="1.0" encoding="utf-8"?>
+<p:sld xmlns:a="http://schemas.openxmlformats.org/drawingml/2006/main" xmlns:r="http://schemas.openxmlformats.org/officeDocument/2006/relationships" xmlns:p="http://schemas.openxmlformats.org/presentationml/2006/main">
+  <p:cSld>
+    <p:spTree>
+      <p:nvGrpSpPr>
+        <p:cNvPr id="1" name=""/>
+        <p:cNvGrpSpPr/>
+        <p:nvPr/>
+      </p:nvGrpSpPr>
+      <p:grpSpPr>
+        <a:xfrm>
+          <a:off x="0" y="0"/>
+          <a:ext cx="0" cy="0"/>
+          <a:chOff x="0" y="0"/>
+          <a:chExt cx="0" cy="0"/>
+        </a:xfrm>
+      </p:grpSpPr>
+      <p:sp>
+        <p:nvSpPr>
+          <p:cNvPr id="2" name="Título 1"/>
+          <p:cNvSpPr>
+            <a:spLocks noGrp="1"/>
+          </p:cNvSpPr>
+          <p:nvPr>
+            <p:ph type="title"/>
+          </p:nvPr>
+        </p:nvSpPr>
+        <p:spPr/>
+        <p:txBody>
+          <a:bodyPr rtlCol="0"/>
+          <a:lstStyle/>
+          <a:p>
+            <a:pPr rtl="0"/>
+            <a:r>
+              <a:rPr lang="es-ES" dirty="0"/>
               <a:t>Agregar un título de diapositiva (5)</a:t>
             </a:r>
           </a:p>
@@ -13397,7 +13637,7 @@
             <a:fld id="{7DC1BBB0-96F0-4077-A278-0F3FB5C104D3}" type="slidenum">
               <a:rPr lang="es-ES" noProof="0" smtClean="0"/>
               <a:pPr rtl="0"/>
-              <a:t>14</a:t>
+              <a:t>15</a:t>
             </a:fld>
             <a:endParaRPr lang="es-ES" noProof="0" dirty="0"/>
           </a:p>
@@ -14115,42 +14355,6 @@
         <p:spPr>
           <a:xfrm>
             <a:off x="10774932" y="2205224"/>
-            <a:ext cx="0" cy="3240000"/>
-          </a:xfrm>
-          <a:prstGeom prst="line">
-            <a:avLst/>
-          </a:prstGeom>
-        </p:spPr>
-        <p:style>
-          <a:lnRef idx="1">
-            <a:schemeClr val="dk1"/>
-          </a:lnRef>
-          <a:fillRef idx="0">
-            <a:schemeClr val="dk1"/>
-          </a:fillRef>
-          <a:effectRef idx="0">
-            <a:schemeClr val="dk1"/>
-          </a:effectRef>
-          <a:fontRef idx="minor">
-            <a:schemeClr val="tx1"/>
-          </a:fontRef>
-        </p:style>
-      </p:cxnSp>
-      <p:cxnSp>
-        <p:nvCxnSpPr>
-          <p:cNvPr id="51" name="Conector recto 50">
-            <a:extLst>
-              <a:ext uri="{FF2B5EF4-FFF2-40B4-BE49-F238E27FC236}">
-                <a16:creationId xmlns:a16="http://schemas.microsoft.com/office/drawing/2014/main" id="{A7FD9FF3-1324-4118-AB86-30A6ED9FBB94}"/>
-              </a:ext>
-            </a:extLst>
-          </p:cNvPr>
-          <p:cNvCxnSpPr/>
-          <p:nvPr/>
-        </p:nvCxnSpPr>
-        <p:spPr>
-          <a:xfrm>
-            <a:off x="1701924" y="2205224"/>
             <a:ext cx="0" cy="3240000"/>
           </a:xfrm>
           <a:prstGeom prst="line">
@@ -14753,7 +14957,7 @@
         <p:spPr>
           <a:xfrm>
             <a:off x="4298701" y="5005636"/>
-            <a:ext cx="1340432" cy="338554"/>
+            <a:ext cx="1340432" cy="584775"/>
           </a:xfrm>
           <a:prstGeom prst="rect">
             <a:avLst/>
@@ -14786,6 +14990,66 @@
               <a:t>MODIFICADO</a:t>
             </a:r>
           </a:p>
+          <a:p>
+            <a:pPr algn="ctr"/>
+            <a:r>
+              <a:rPr lang="es-PE" sz="1600" b="1" dirty="0">
+                <a:solidFill>
+                  <a:schemeClr val="accent5">
+                    <a:lumMod val="75000"/>
+                  </a:schemeClr>
+                </a:solidFill>
+                <a:effectLst>
+                  <a:outerShdw blurRad="38100" dist="38100" dir="2700000" algn="tl">
+                    <a:srgbClr val="000000">
+                      <a:alpha val="43137"/>
+                    </a:srgbClr>
+                  </a:outerShdw>
+                </a:effectLst>
+                <a:latin typeface="Calibri" panose="020F0502020204030204" pitchFamily="34" charset="0"/>
+                <a:cs typeface="Calibri" panose="020F0502020204030204" pitchFamily="34" charset="0"/>
+              </a:rPr>
+              <a:t>(</a:t>
+            </a:r>
+            <a:r>
+              <a:rPr lang="es-PE" sz="1600" b="1" dirty="0" err="1">
+                <a:solidFill>
+                  <a:schemeClr val="accent5">
+                    <a:lumMod val="75000"/>
+                  </a:schemeClr>
+                </a:solidFill>
+                <a:effectLst>
+                  <a:outerShdw blurRad="38100" dist="38100" dir="2700000" algn="tl">
+                    <a:srgbClr val="000000">
+                      <a:alpha val="43137"/>
+                    </a:srgbClr>
+                  </a:outerShdw>
+                </a:effectLst>
+                <a:latin typeface="Calibri" panose="020F0502020204030204" pitchFamily="34" charset="0"/>
+                <a:cs typeface="Calibri" panose="020F0502020204030204" pitchFamily="34" charset="0"/>
+              </a:rPr>
+              <a:t>Modified</a:t>
+            </a:r>
+            <a:r>
+              <a:rPr lang="es-PE" sz="1600" b="1" dirty="0">
+                <a:solidFill>
+                  <a:schemeClr val="accent5">
+                    <a:lumMod val="75000"/>
+                  </a:schemeClr>
+                </a:solidFill>
+                <a:effectLst>
+                  <a:outerShdw blurRad="38100" dist="38100" dir="2700000" algn="tl">
+                    <a:srgbClr val="000000">
+                      <a:alpha val="43137"/>
+                    </a:srgbClr>
+                  </a:outerShdw>
+                </a:effectLst>
+                <a:latin typeface="Calibri" panose="020F0502020204030204" pitchFamily="34" charset="0"/>
+                <a:cs typeface="Calibri" panose="020F0502020204030204" pitchFamily="34" charset="0"/>
+              </a:rPr>
+              <a:t>)</a:t>
+            </a:r>
+          </a:p>
         </p:txBody>
       </p:sp>
       <p:sp>
@@ -14803,7 +15067,7 @@
         <p:spPr>
           <a:xfrm>
             <a:off x="6542647" y="5005636"/>
-            <a:ext cx="1684757" cy="338554"/>
+            <a:ext cx="1684757" cy="584775"/>
           </a:xfrm>
           <a:prstGeom prst="rect">
             <a:avLst/>
@@ -14836,6 +15100,66 @@
               <a:t>EN PREPARACIÓN</a:t>
             </a:r>
           </a:p>
+          <a:p>
+            <a:pPr algn="ctr"/>
+            <a:r>
+              <a:rPr lang="es-PE" sz="1600" b="1" dirty="0">
+                <a:solidFill>
+                  <a:schemeClr val="accent5">
+                    <a:lumMod val="75000"/>
+                  </a:schemeClr>
+                </a:solidFill>
+                <a:effectLst>
+                  <a:outerShdw blurRad="38100" dist="38100" dir="2700000" algn="tl">
+                    <a:srgbClr val="000000">
+                      <a:alpha val="43137"/>
+                    </a:srgbClr>
+                  </a:outerShdw>
+                </a:effectLst>
+                <a:latin typeface="Calibri" panose="020F0502020204030204" pitchFamily="34" charset="0"/>
+                <a:cs typeface="Calibri" panose="020F0502020204030204" pitchFamily="34" charset="0"/>
+              </a:rPr>
+              <a:t>(</a:t>
+            </a:r>
+            <a:r>
+              <a:rPr lang="es-PE" sz="1600" b="1" dirty="0" err="1">
+                <a:solidFill>
+                  <a:schemeClr val="accent5">
+                    <a:lumMod val="75000"/>
+                  </a:schemeClr>
+                </a:solidFill>
+                <a:effectLst>
+                  <a:outerShdw blurRad="38100" dist="38100" dir="2700000" algn="tl">
+                    <a:srgbClr val="000000">
+                      <a:alpha val="43137"/>
+                    </a:srgbClr>
+                  </a:outerShdw>
+                </a:effectLst>
+                <a:latin typeface="Calibri" panose="020F0502020204030204" pitchFamily="34" charset="0"/>
+                <a:cs typeface="Calibri" panose="020F0502020204030204" pitchFamily="34" charset="0"/>
+              </a:rPr>
+              <a:t>Staged</a:t>
+            </a:r>
+            <a:r>
+              <a:rPr lang="es-PE" sz="1600" b="1" dirty="0">
+                <a:solidFill>
+                  <a:schemeClr val="accent5">
+                    <a:lumMod val="75000"/>
+                  </a:schemeClr>
+                </a:solidFill>
+                <a:effectLst>
+                  <a:outerShdw blurRad="38100" dist="38100" dir="2700000" algn="tl">
+                    <a:srgbClr val="000000">
+                      <a:alpha val="43137"/>
+                    </a:srgbClr>
+                  </a:outerShdw>
+                </a:effectLst>
+                <a:latin typeface="Calibri" panose="020F0502020204030204" pitchFamily="34" charset="0"/>
+                <a:cs typeface="Calibri" panose="020F0502020204030204" pitchFamily="34" charset="0"/>
+              </a:rPr>
+              <a:t>)</a:t>
+            </a:r>
+          </a:p>
         </p:txBody>
       </p:sp>
       <p:sp>
@@ -14853,7 +15177,7 @@
         <p:spPr>
           <a:xfrm>
             <a:off x="8842596" y="4991749"/>
-            <a:ext cx="1404680" cy="338554"/>
+            <a:ext cx="1404680" cy="584775"/>
           </a:xfrm>
           <a:prstGeom prst="rect">
             <a:avLst/>
@@ -14884,6 +15208,66 @@
                 <a:cs typeface="Calibri" panose="020F0502020204030204" pitchFamily="34" charset="0"/>
               </a:rPr>
               <a:t>CONFIRMADO</a:t>
+            </a:r>
+          </a:p>
+          <a:p>
+            <a:pPr algn="ctr"/>
+            <a:r>
+              <a:rPr lang="es-PE" sz="1600" b="1" dirty="0">
+                <a:solidFill>
+                  <a:schemeClr val="accent5">
+                    <a:lumMod val="75000"/>
+                  </a:schemeClr>
+                </a:solidFill>
+                <a:effectLst>
+                  <a:outerShdw blurRad="38100" dist="38100" dir="2700000" algn="tl">
+                    <a:srgbClr val="000000">
+                      <a:alpha val="43137"/>
+                    </a:srgbClr>
+                  </a:outerShdw>
+                </a:effectLst>
+                <a:latin typeface="Calibri" panose="020F0502020204030204" pitchFamily="34" charset="0"/>
+                <a:cs typeface="Calibri" panose="020F0502020204030204" pitchFamily="34" charset="0"/>
+              </a:rPr>
+              <a:t>(</a:t>
+            </a:r>
+            <a:r>
+              <a:rPr lang="es-PE" sz="1600" b="1" dirty="0" err="1">
+                <a:solidFill>
+                  <a:schemeClr val="accent5">
+                    <a:lumMod val="75000"/>
+                  </a:schemeClr>
+                </a:solidFill>
+                <a:effectLst>
+                  <a:outerShdw blurRad="38100" dist="38100" dir="2700000" algn="tl">
+                    <a:srgbClr val="000000">
+                      <a:alpha val="43137"/>
+                    </a:srgbClr>
+                  </a:outerShdw>
+                </a:effectLst>
+                <a:latin typeface="Calibri" panose="020F0502020204030204" pitchFamily="34" charset="0"/>
+                <a:cs typeface="Calibri" panose="020F0502020204030204" pitchFamily="34" charset="0"/>
+              </a:rPr>
+              <a:t>Commited</a:t>
+            </a:r>
+            <a:r>
+              <a:rPr lang="es-PE" sz="1600" b="1" dirty="0">
+                <a:solidFill>
+                  <a:schemeClr val="accent5">
+                    <a:lumMod val="75000"/>
+                  </a:schemeClr>
+                </a:solidFill>
+                <a:effectLst>
+                  <a:outerShdw blurRad="38100" dist="38100" dir="2700000" algn="tl">
+                    <a:srgbClr val="000000">
+                      <a:alpha val="43137"/>
+                    </a:srgbClr>
+                  </a:outerShdw>
+                </a:effectLst>
+                <a:latin typeface="Calibri" panose="020F0502020204030204" pitchFamily="34" charset="0"/>
+                <a:cs typeface="Calibri" panose="020F0502020204030204" pitchFamily="34" charset="0"/>
+              </a:rPr>
+              <a:t>)</a:t>
             </a:r>
           </a:p>
         </p:txBody>
@@ -15113,6 +15497,130 @@
               <a:rPr lang="es-ES" sz="1050" dirty="0"/>
               <a:t>, Brinda espacio para preparar los cambios que se reflejarán en la próxima confirmación, con las modificaciones que se requieran antes de realizar la confirmación</a:t>
             </a:r>
+          </a:p>
+        </p:txBody>
+      </p:sp>
+      <p:sp>
+        <p:nvSpPr>
+          <p:cNvPr id="4" name="CuadroTexto 3">
+            <a:extLst>
+              <a:ext uri="{FF2B5EF4-FFF2-40B4-BE49-F238E27FC236}">
+                <a16:creationId xmlns:a16="http://schemas.microsoft.com/office/drawing/2014/main" id="{94892F08-362B-C4EA-C506-45021F760D2B}"/>
+              </a:ext>
+            </a:extLst>
+          </p:cNvPr>
+          <p:cNvSpPr txBox="1"/>
+          <p:nvPr/>
+        </p:nvSpPr>
+        <p:spPr>
+          <a:xfrm rot="16200000">
+            <a:off x="-1149062" y="3430159"/>
+            <a:ext cx="4064382" cy="461665"/>
+          </a:xfrm>
+          <a:prstGeom prst="rect">
+            <a:avLst/>
+          </a:prstGeom>
+          <a:noFill/>
+        </p:spPr>
+        <p:txBody>
+          <a:bodyPr wrap="none" rtlCol="0">
+            <a:spAutoFit/>
+          </a:bodyPr>
+          <a:lstStyle/>
+          <a:p>
+            <a:r>
+              <a:rPr lang="es-MX" sz="2400" b="1" dirty="0">
+                <a:solidFill>
+                  <a:schemeClr val="bg1"/>
+                </a:solidFill>
+                <a:effectLst>
+                  <a:outerShdw blurRad="38100" dist="38100" dir="2700000" algn="tl">
+                    <a:srgbClr val="000000">
+                      <a:alpha val="43137"/>
+                    </a:srgbClr>
+                  </a:outerShdw>
+                </a:effectLst>
+                <a:latin typeface="Calibri" panose="020F0502020204030204" pitchFamily="34" charset="0"/>
+                <a:cs typeface="Calibri" panose="020F0502020204030204" pitchFamily="34" charset="0"/>
+              </a:rPr>
+              <a:t>AMBIENTES Y ESTADOS EN GIT</a:t>
+            </a:r>
+            <a:endParaRPr lang="es-PE" sz="2400" b="1" dirty="0">
+              <a:solidFill>
+                <a:schemeClr val="bg1"/>
+              </a:solidFill>
+              <a:effectLst>
+                <a:outerShdw blurRad="38100" dist="38100" dir="2700000" algn="tl">
+                  <a:srgbClr val="000000">
+                    <a:alpha val="43137"/>
+                  </a:srgbClr>
+                </a:outerShdw>
+              </a:effectLst>
+              <a:latin typeface="Calibri" panose="020F0502020204030204" pitchFamily="34" charset="0"/>
+              <a:cs typeface="Calibri" panose="020F0502020204030204" pitchFamily="34" charset="0"/>
+            </a:endParaRPr>
+          </a:p>
+        </p:txBody>
+      </p:sp>
+      <p:sp>
+        <p:nvSpPr>
+          <p:cNvPr id="5" name="CuadroTexto 4">
+            <a:extLst>
+              <a:ext uri="{FF2B5EF4-FFF2-40B4-BE49-F238E27FC236}">
+                <a16:creationId xmlns:a16="http://schemas.microsoft.com/office/drawing/2014/main" id="{6CC366F2-10C0-E639-996E-03FB6C9F4A55}"/>
+              </a:ext>
+            </a:extLst>
+          </p:cNvPr>
+          <p:cNvSpPr txBox="1"/>
+          <p:nvPr/>
+        </p:nvSpPr>
+        <p:spPr>
+          <a:xfrm rot="16200000">
+            <a:off x="-1121033" y="3400442"/>
+            <a:ext cx="2899512" cy="461665"/>
+          </a:xfrm>
+          <a:prstGeom prst="rect">
+            <a:avLst/>
+          </a:prstGeom>
+          <a:noFill/>
+        </p:spPr>
+        <p:txBody>
+          <a:bodyPr wrap="none" rtlCol="0">
+            <a:spAutoFit/>
+          </a:bodyPr>
+          <a:lstStyle/>
+          <a:p>
+            <a:r>
+              <a:rPr lang="es-MX" sz="2400" b="1" dirty="0">
+                <a:solidFill>
+                  <a:schemeClr val="bg1"/>
+                </a:solidFill>
+                <a:effectLst>
+                  <a:outerShdw blurRad="38100" dist="38100" dir="2700000" algn="tl">
+                    <a:srgbClr val="000000">
+                      <a:alpha val="43137"/>
+                    </a:srgbClr>
+                  </a:outerShdw>
+                </a:effectLst>
+                <a:latin typeface="Calibri" panose="020F0502020204030204" pitchFamily="34" charset="0"/>
+                <a:cs typeface="Calibri" panose="020F0502020204030204" pitchFamily="34" charset="0"/>
+              </a:rPr>
+              <a:t>CONCEPTOS BÁSICOS</a:t>
+            </a:r>
+            <a:endParaRPr lang="es-PE" sz="2400" b="1" dirty="0">
+              <a:solidFill>
+                <a:schemeClr val="bg1"/>
+              </a:solidFill>
+              <a:effectLst>
+                <a:outerShdw blurRad="38100" dist="38100" dir="2700000" algn="tl">
+                  <a:srgbClr val="000000">
+                    <a:alpha val="43137"/>
+                  </a:srgbClr>
+                </a:outerShdw>
+              </a:effectLst>
+              <a:latin typeface="Calibri" panose="020F0502020204030204" pitchFamily="34" charset="0"/>
+              <a:cs typeface="Calibri" panose="020F0502020204030204" pitchFamily="34" charset="0"/>
+            </a:endParaRPr>
           </a:p>
         </p:txBody>
       </p:sp>
@@ -15238,96 +15746,6 @@
           </a:extLst>
         </p:spPr>
       </p:pic>
-      <p:cxnSp>
-        <p:nvCxnSpPr>
-          <p:cNvPr id="10" name="Conector recto de flecha 9">
-            <a:extLst>
-              <a:ext uri="{FF2B5EF4-FFF2-40B4-BE49-F238E27FC236}">
-                <a16:creationId xmlns:a16="http://schemas.microsoft.com/office/drawing/2014/main" id="{17FEE7F4-D4F7-43C6-8241-BE0F74F429EA}"/>
-              </a:ext>
-            </a:extLst>
-          </p:cNvPr>
-          <p:cNvCxnSpPr>
-            <a:cxnSpLocks/>
-          </p:cNvCxnSpPr>
-          <p:nvPr/>
-        </p:nvCxnSpPr>
-        <p:spPr>
-          <a:xfrm flipH="1">
-            <a:off x="2709981" y="1781828"/>
-            <a:ext cx="6149" cy="913523"/>
-          </a:xfrm>
-          <a:prstGeom prst="straightConnector1">
-            <a:avLst/>
-          </a:prstGeom>
-          <a:ln>
-            <a:solidFill>
-              <a:srgbClr val="C00000"/>
-            </a:solidFill>
-            <a:prstDash val="dash"/>
-            <a:tailEnd type="triangle"/>
-          </a:ln>
-        </p:spPr>
-        <p:style>
-          <a:lnRef idx="1">
-            <a:schemeClr val="accent1"/>
-          </a:lnRef>
-          <a:fillRef idx="0">
-            <a:schemeClr val="accent1"/>
-          </a:fillRef>
-          <a:effectRef idx="0">
-            <a:schemeClr val="accent1"/>
-          </a:effectRef>
-          <a:fontRef idx="minor">
-            <a:schemeClr val="tx1"/>
-          </a:fontRef>
-        </p:style>
-      </p:cxnSp>
-      <p:cxnSp>
-        <p:nvCxnSpPr>
-          <p:cNvPr id="22" name="Conector recto de flecha 21">
-            <a:extLst>
-              <a:ext uri="{FF2B5EF4-FFF2-40B4-BE49-F238E27FC236}">
-                <a16:creationId xmlns:a16="http://schemas.microsoft.com/office/drawing/2014/main" id="{2AC136BE-53A9-45F8-B467-F0DC37E2B809}"/>
-              </a:ext>
-            </a:extLst>
-          </p:cNvPr>
-          <p:cNvCxnSpPr>
-            <a:cxnSpLocks/>
-          </p:cNvCxnSpPr>
-          <p:nvPr/>
-        </p:nvCxnSpPr>
-        <p:spPr>
-          <a:xfrm flipH="1">
-            <a:off x="4859231" y="2428159"/>
-            <a:ext cx="4632" cy="267192"/>
-          </a:xfrm>
-          <a:prstGeom prst="straightConnector1">
-            <a:avLst/>
-          </a:prstGeom>
-          <a:ln>
-            <a:solidFill>
-              <a:srgbClr val="C00000"/>
-            </a:solidFill>
-            <a:prstDash val="dash"/>
-            <a:tailEnd type="triangle"/>
-          </a:ln>
-        </p:spPr>
-        <p:style>
-          <a:lnRef idx="1">
-            <a:schemeClr val="accent1"/>
-          </a:lnRef>
-          <a:fillRef idx="0">
-            <a:schemeClr val="accent1"/>
-          </a:fillRef>
-          <a:effectRef idx="0">
-            <a:schemeClr val="accent1"/>
-          </a:effectRef>
-          <a:fontRef idx="minor">
-            <a:schemeClr val="tx1"/>
-          </a:fontRef>
-        </p:style>
-      </p:cxnSp>
       <p:sp>
         <p:nvSpPr>
           <p:cNvPr id="25" name="Rectángulo 24">
@@ -15342,8 +15760,8 @@
         </p:nvSpPr>
         <p:spPr>
           <a:xfrm>
-            <a:off x="8254652" y="879577"/>
-            <a:ext cx="1800200" cy="1061829"/>
+            <a:off x="8146277" y="869039"/>
+            <a:ext cx="1998965" cy="1061829"/>
           </a:xfrm>
           <a:prstGeom prst="rect">
             <a:avLst/>
@@ -15396,13 +15814,14 @@
           </p:cNvPr>
           <p:cNvCxnSpPr>
             <a:cxnSpLocks/>
+            <a:stCxn id="19" idx="2"/>
           </p:cNvCxnSpPr>
           <p:nvPr/>
         </p:nvCxnSpPr>
         <p:spPr>
           <a:xfrm>
-            <a:off x="7011596" y="2102989"/>
-            <a:ext cx="0" cy="592362"/>
+            <a:off x="7011595" y="852790"/>
+            <a:ext cx="1" cy="1842561"/>
           </a:xfrm>
           <a:prstGeom prst="straightConnector1">
             <a:avLst/>
@@ -15446,9 +15865,9 @@
           <p:nvPr/>
         </p:nvCxnSpPr>
         <p:spPr>
-          <a:xfrm>
-            <a:off x="9154752" y="1941406"/>
-            <a:ext cx="4578" cy="753945"/>
+          <a:xfrm flipH="1">
+            <a:off x="9141750" y="1930868"/>
+            <a:ext cx="4010" cy="753945"/>
           </a:xfrm>
           <a:prstGeom prst="straightConnector1">
             <a:avLst/>
@@ -15532,7 +15951,7 @@
         <p:spPr>
           <a:xfrm>
             <a:off x="1561223" y="336473"/>
-            <a:ext cx="2304527" cy="523220"/>
+            <a:ext cx="2304527" cy="738664"/>
           </a:xfrm>
           <a:prstGeom prst="rect">
             <a:avLst/>
@@ -15561,7 +15980,7 @@
                   </a:outerShdw>
                 </a:effectLst>
               </a:rPr>
-              <a:t>Archivos en estado modificado y confirmado</a:t>
+              <a:t>Archivos en estado modificado y/o confirmado</a:t>
             </a:r>
           </a:p>
         </p:txBody>
@@ -15719,7 +16138,7 @@
         <p:spPr>
           <a:xfrm>
             <a:off x="7964739" y="336473"/>
-            <a:ext cx="2304527" cy="523220"/>
+            <a:ext cx="2304527" cy="307777"/>
           </a:xfrm>
           <a:prstGeom prst="rect">
             <a:avLst/>
@@ -15748,27 +16167,7 @@
                   </a:outerShdw>
                 </a:effectLst>
               </a:rPr>
-              <a:t>Archivos en estado </a:t>
-            </a:r>
-          </a:p>
-          <a:p>
-            <a:pPr algn="ctr"/>
-            <a:r>
-              <a:rPr lang="es-PE" sz="1400" b="1" dirty="0">
-                <a:solidFill>
-                  <a:schemeClr val="accent5">
-                    <a:lumMod val="75000"/>
-                  </a:schemeClr>
-                </a:solidFill>
-                <a:effectLst>
-                  <a:outerShdw blurRad="38100" dist="38100" dir="2700000" algn="tl">
-                    <a:srgbClr val="000000">
-                      <a:alpha val="43137"/>
-                    </a:srgbClr>
-                  </a:outerShdw>
-                </a:effectLst>
-              </a:rPr>
-              <a:t>Compartidos</a:t>
+              <a:t>Archivos en la Nube</a:t>
             </a:r>
           </a:p>
         </p:txBody>
@@ -16040,6 +16439,222 @@
           </a:fontRef>
         </p:style>
       </p:cxnSp>
+      <p:sp>
+        <p:nvSpPr>
+          <p:cNvPr id="2" name="CuadroTexto 1">
+            <a:extLst>
+              <a:ext uri="{FF2B5EF4-FFF2-40B4-BE49-F238E27FC236}">
+                <a16:creationId xmlns:a16="http://schemas.microsoft.com/office/drawing/2014/main" id="{385B9208-6506-683A-1092-ECA25746D5E8}"/>
+              </a:ext>
+            </a:extLst>
+          </p:cNvPr>
+          <p:cNvSpPr txBox="1"/>
+          <p:nvPr/>
+        </p:nvSpPr>
+        <p:spPr>
+          <a:xfrm rot="16200000">
+            <a:off x="-1121033" y="3400442"/>
+            <a:ext cx="2899512" cy="461665"/>
+          </a:xfrm>
+          <a:prstGeom prst="rect">
+            <a:avLst/>
+          </a:prstGeom>
+          <a:noFill/>
+        </p:spPr>
+        <p:txBody>
+          <a:bodyPr wrap="none" rtlCol="0">
+            <a:spAutoFit/>
+          </a:bodyPr>
+          <a:lstStyle/>
+          <a:p>
+            <a:r>
+              <a:rPr lang="es-MX" sz="2400" b="1" dirty="0">
+                <a:solidFill>
+                  <a:schemeClr val="bg1"/>
+                </a:solidFill>
+                <a:effectLst>
+                  <a:outerShdw blurRad="38100" dist="38100" dir="2700000" algn="tl">
+                    <a:srgbClr val="000000">
+                      <a:alpha val="43137"/>
+                    </a:srgbClr>
+                  </a:outerShdw>
+                </a:effectLst>
+                <a:latin typeface="Calibri" panose="020F0502020204030204" pitchFamily="34" charset="0"/>
+                <a:cs typeface="Calibri" panose="020F0502020204030204" pitchFamily="34" charset="0"/>
+              </a:rPr>
+              <a:t>CONCEPTOS BÁSICOS</a:t>
+            </a:r>
+            <a:endParaRPr lang="es-PE" sz="2400" b="1" dirty="0">
+              <a:solidFill>
+                <a:schemeClr val="bg1"/>
+              </a:solidFill>
+              <a:effectLst>
+                <a:outerShdw blurRad="38100" dist="38100" dir="2700000" algn="tl">
+                  <a:srgbClr val="000000">
+                    <a:alpha val="43137"/>
+                  </a:srgbClr>
+                </a:outerShdw>
+              </a:effectLst>
+              <a:latin typeface="Calibri" panose="020F0502020204030204" pitchFamily="34" charset="0"/>
+              <a:cs typeface="Calibri" panose="020F0502020204030204" pitchFamily="34" charset="0"/>
+            </a:endParaRPr>
+          </a:p>
+        </p:txBody>
+      </p:sp>
+      <p:sp>
+        <p:nvSpPr>
+          <p:cNvPr id="5" name="CuadroTexto 4">
+            <a:extLst>
+              <a:ext uri="{FF2B5EF4-FFF2-40B4-BE49-F238E27FC236}">
+                <a16:creationId xmlns:a16="http://schemas.microsoft.com/office/drawing/2014/main" id="{D9987EA6-DE13-79C2-4CDF-73C346DC30B0}"/>
+              </a:ext>
+            </a:extLst>
+          </p:cNvPr>
+          <p:cNvSpPr txBox="1"/>
+          <p:nvPr/>
+        </p:nvSpPr>
+        <p:spPr>
+          <a:xfrm rot="16200000">
+            <a:off x="-1040886" y="3430159"/>
+            <a:ext cx="3848041" cy="461665"/>
+          </a:xfrm>
+          <a:prstGeom prst="rect">
+            <a:avLst/>
+          </a:prstGeom>
+          <a:noFill/>
+        </p:spPr>
+        <p:txBody>
+          <a:bodyPr wrap="none" rtlCol="0">
+            <a:spAutoFit/>
+          </a:bodyPr>
+          <a:lstStyle/>
+          <a:p>
+            <a:r>
+              <a:rPr lang="es-MX" sz="2400" b="1" dirty="0">
+                <a:solidFill>
+                  <a:schemeClr val="bg1"/>
+                </a:solidFill>
+                <a:effectLst>
+                  <a:outerShdw blurRad="38100" dist="38100" dir="2700000" algn="tl">
+                    <a:srgbClr val="000000">
+                      <a:alpha val="43137"/>
+                    </a:srgbClr>
+                  </a:outerShdw>
+                </a:effectLst>
+                <a:latin typeface="Calibri" panose="020F0502020204030204" pitchFamily="34" charset="0"/>
+                <a:cs typeface="Calibri" panose="020F0502020204030204" pitchFamily="34" charset="0"/>
+              </a:rPr>
+              <a:t>COMANDOS BÁSICOS EN GIT</a:t>
+            </a:r>
+            <a:endParaRPr lang="es-PE" sz="2400" b="1" dirty="0">
+              <a:solidFill>
+                <a:schemeClr val="bg1"/>
+              </a:solidFill>
+              <a:effectLst>
+                <a:outerShdw blurRad="38100" dist="38100" dir="2700000" algn="tl">
+                  <a:srgbClr val="000000">
+                    <a:alpha val="43137"/>
+                  </a:srgbClr>
+                </a:outerShdw>
+              </a:effectLst>
+              <a:latin typeface="Calibri" panose="020F0502020204030204" pitchFamily="34" charset="0"/>
+              <a:cs typeface="Calibri" panose="020F0502020204030204" pitchFamily="34" charset="0"/>
+            </a:endParaRPr>
+          </a:p>
+        </p:txBody>
+      </p:sp>
+      <p:cxnSp>
+        <p:nvCxnSpPr>
+          <p:cNvPr id="16" name="Conector recto de flecha 15">
+            <a:extLst>
+              <a:ext uri="{FF2B5EF4-FFF2-40B4-BE49-F238E27FC236}">
+                <a16:creationId xmlns:a16="http://schemas.microsoft.com/office/drawing/2014/main" id="{F6EA1C30-BA28-C9DC-2FCC-CCC8872466B0}"/>
+              </a:ext>
+            </a:extLst>
+          </p:cNvPr>
+          <p:cNvCxnSpPr>
+            <a:cxnSpLocks/>
+            <a:stCxn id="18" idx="2"/>
+          </p:cNvCxnSpPr>
+          <p:nvPr/>
+        </p:nvCxnSpPr>
+        <p:spPr>
+          <a:xfrm flipH="1">
+            <a:off x="4891842" y="854878"/>
+            <a:ext cx="14345" cy="1840473"/>
+          </a:xfrm>
+          <a:prstGeom prst="straightConnector1">
+            <a:avLst/>
+          </a:prstGeom>
+          <a:ln>
+            <a:solidFill>
+              <a:srgbClr val="C00000"/>
+            </a:solidFill>
+            <a:prstDash val="dash"/>
+            <a:tailEnd type="triangle"/>
+          </a:ln>
+        </p:spPr>
+        <p:style>
+          <a:lnRef idx="1">
+            <a:schemeClr val="accent1"/>
+          </a:lnRef>
+          <a:fillRef idx="0">
+            <a:schemeClr val="accent1"/>
+          </a:fillRef>
+          <a:effectRef idx="0">
+            <a:schemeClr val="accent1"/>
+          </a:effectRef>
+          <a:fontRef idx="minor">
+            <a:schemeClr val="tx1"/>
+          </a:fontRef>
+        </p:style>
+      </p:cxnSp>
+      <p:cxnSp>
+        <p:nvCxnSpPr>
+          <p:cNvPr id="29" name="Conector recto de flecha 28">
+            <a:extLst>
+              <a:ext uri="{FF2B5EF4-FFF2-40B4-BE49-F238E27FC236}">
+                <a16:creationId xmlns:a16="http://schemas.microsoft.com/office/drawing/2014/main" id="{C477E45A-7908-58C5-2EF9-0FFCDF92DAB0}"/>
+              </a:ext>
+            </a:extLst>
+          </p:cNvPr>
+          <p:cNvCxnSpPr>
+            <a:cxnSpLocks/>
+            <a:stCxn id="7" idx="2"/>
+          </p:cNvCxnSpPr>
+          <p:nvPr/>
+        </p:nvCxnSpPr>
+        <p:spPr>
+          <a:xfrm flipH="1">
+            <a:off x="2702899" y="1075137"/>
+            <a:ext cx="10588" cy="1548206"/>
+          </a:xfrm>
+          <a:prstGeom prst="straightConnector1">
+            <a:avLst/>
+          </a:prstGeom>
+          <a:ln>
+            <a:solidFill>
+              <a:srgbClr val="C00000"/>
+            </a:solidFill>
+            <a:prstDash val="dash"/>
+            <a:tailEnd type="triangle"/>
+          </a:ln>
+        </p:spPr>
+        <p:style>
+          <a:lnRef idx="1">
+            <a:schemeClr val="accent1"/>
+          </a:lnRef>
+          <a:fillRef idx="0">
+            <a:schemeClr val="accent1"/>
+          </a:fillRef>
+          <a:effectRef idx="0">
+            <a:schemeClr val="accent1"/>
+          </a:effectRef>
+          <a:fontRef idx="minor">
+            <a:schemeClr val="tx1"/>
+          </a:fontRef>
+        </p:style>
+      </p:cxnSp>
     </p:spTree>
     <p:extLst>
       <p:ext uri="{BB962C8B-B14F-4D97-AF65-F5344CB8AC3E}">
@@ -16084,6 +16699,1163 @@
       </p:grpSpPr>
       <p:sp>
         <p:nvSpPr>
+          <p:cNvPr id="3" name="Marcador de número de diapositiva 2">
+            <a:extLst>
+              <a:ext uri="{FF2B5EF4-FFF2-40B4-BE49-F238E27FC236}">
+                <a16:creationId xmlns:a16="http://schemas.microsoft.com/office/drawing/2014/main" id="{8D2D6617-46E2-4BB5-A527-766D31BC6FE3}"/>
+              </a:ext>
+            </a:extLst>
+          </p:cNvPr>
+          <p:cNvSpPr>
+            <a:spLocks noGrp="1"/>
+          </p:cNvSpPr>
+          <p:nvPr>
+            <p:ph type="sldNum" sz="quarter" idx="12"/>
+          </p:nvPr>
+        </p:nvSpPr>
+        <p:spPr>
+          <a:xfrm>
+            <a:off x="10766796" y="6448251"/>
+            <a:ext cx="609441" cy="365125"/>
+          </a:xfrm>
+        </p:spPr>
+        <p:txBody>
+          <a:bodyPr/>
+          <a:lstStyle/>
+          <a:p>
+            <a:pPr rtl="0"/>
+            <a:fld id="{7DC1BBB0-96F0-4077-A278-0F3FB5C104D3}" type="slidenum">
+              <a:rPr lang="es-ES" noProof="0" smtClean="0"/>
+              <a:t>5</a:t>
+            </a:fld>
+            <a:endParaRPr lang="es-ES" noProof="0" dirty="0"/>
+          </a:p>
+        </p:txBody>
+      </p:sp>
+      <p:sp>
+        <p:nvSpPr>
+          <p:cNvPr id="2" name="CuadroTexto 1">
+            <a:extLst>
+              <a:ext uri="{FF2B5EF4-FFF2-40B4-BE49-F238E27FC236}">
+                <a16:creationId xmlns:a16="http://schemas.microsoft.com/office/drawing/2014/main" id="{385B9208-6506-683A-1092-ECA25746D5E8}"/>
+              </a:ext>
+            </a:extLst>
+          </p:cNvPr>
+          <p:cNvSpPr txBox="1"/>
+          <p:nvPr/>
+        </p:nvSpPr>
+        <p:spPr>
+          <a:xfrm rot="16200000">
+            <a:off x="-1121033" y="3400442"/>
+            <a:ext cx="2899512" cy="461665"/>
+          </a:xfrm>
+          <a:prstGeom prst="rect">
+            <a:avLst/>
+          </a:prstGeom>
+          <a:noFill/>
+        </p:spPr>
+        <p:txBody>
+          <a:bodyPr wrap="none" rtlCol="0">
+            <a:spAutoFit/>
+          </a:bodyPr>
+          <a:lstStyle/>
+          <a:p>
+            <a:r>
+              <a:rPr lang="es-MX" sz="2400" b="1" dirty="0">
+                <a:solidFill>
+                  <a:schemeClr val="bg1"/>
+                </a:solidFill>
+                <a:effectLst>
+                  <a:outerShdw blurRad="38100" dist="38100" dir="2700000" algn="tl">
+                    <a:srgbClr val="000000">
+                      <a:alpha val="43137"/>
+                    </a:srgbClr>
+                  </a:outerShdw>
+                </a:effectLst>
+                <a:latin typeface="Calibri" panose="020F0502020204030204" pitchFamily="34" charset="0"/>
+                <a:cs typeface="Calibri" panose="020F0502020204030204" pitchFamily="34" charset="0"/>
+              </a:rPr>
+              <a:t>CONCEPTOS BÁSICOS</a:t>
+            </a:r>
+            <a:endParaRPr lang="es-PE" sz="2400" b="1" dirty="0">
+              <a:solidFill>
+                <a:schemeClr val="bg1"/>
+              </a:solidFill>
+              <a:effectLst>
+                <a:outerShdw blurRad="38100" dist="38100" dir="2700000" algn="tl">
+                  <a:srgbClr val="000000">
+                    <a:alpha val="43137"/>
+                  </a:srgbClr>
+                </a:outerShdw>
+              </a:effectLst>
+              <a:latin typeface="Calibri" panose="020F0502020204030204" pitchFamily="34" charset="0"/>
+              <a:cs typeface="Calibri" panose="020F0502020204030204" pitchFamily="34" charset="0"/>
+            </a:endParaRPr>
+          </a:p>
+        </p:txBody>
+      </p:sp>
+      <p:sp>
+        <p:nvSpPr>
+          <p:cNvPr id="5" name="CuadroTexto 4">
+            <a:extLst>
+              <a:ext uri="{FF2B5EF4-FFF2-40B4-BE49-F238E27FC236}">
+                <a16:creationId xmlns:a16="http://schemas.microsoft.com/office/drawing/2014/main" id="{D9987EA6-DE13-79C2-4CDF-73C346DC30B0}"/>
+              </a:ext>
+            </a:extLst>
+          </p:cNvPr>
+          <p:cNvSpPr txBox="1"/>
+          <p:nvPr/>
+        </p:nvSpPr>
+        <p:spPr>
+          <a:xfrm rot="16200000">
+            <a:off x="-1307621" y="3430159"/>
+            <a:ext cx="4381520" cy="461665"/>
+          </a:xfrm>
+          <a:prstGeom prst="rect">
+            <a:avLst/>
+          </a:prstGeom>
+          <a:noFill/>
+        </p:spPr>
+        <p:txBody>
+          <a:bodyPr wrap="none" rtlCol="0">
+            <a:spAutoFit/>
+          </a:bodyPr>
+          <a:lstStyle/>
+          <a:p>
+            <a:r>
+              <a:rPr lang="es-MX" sz="2400" b="1" dirty="0">
+                <a:solidFill>
+                  <a:schemeClr val="bg1"/>
+                </a:solidFill>
+                <a:effectLst>
+                  <a:outerShdw blurRad="38100" dist="38100" dir="2700000" algn="tl">
+                    <a:srgbClr val="000000">
+                      <a:alpha val="43137"/>
+                    </a:srgbClr>
+                  </a:outerShdw>
+                </a:effectLst>
+                <a:latin typeface="Calibri" panose="020F0502020204030204" pitchFamily="34" charset="0"/>
+                <a:cs typeface="Calibri" panose="020F0502020204030204" pitchFamily="34" charset="0"/>
+              </a:rPr>
+              <a:t>CONFIGURACIÓN GLOBAL DE GIT</a:t>
+            </a:r>
+            <a:endParaRPr lang="es-PE" sz="2400" b="1" dirty="0">
+              <a:solidFill>
+                <a:schemeClr val="bg1"/>
+              </a:solidFill>
+              <a:effectLst>
+                <a:outerShdw blurRad="38100" dist="38100" dir="2700000" algn="tl">
+                  <a:srgbClr val="000000">
+                    <a:alpha val="43137"/>
+                  </a:srgbClr>
+                </a:outerShdw>
+              </a:effectLst>
+              <a:latin typeface="Calibri" panose="020F0502020204030204" pitchFamily="34" charset="0"/>
+              <a:cs typeface="Calibri" panose="020F0502020204030204" pitchFamily="34" charset="0"/>
+            </a:endParaRPr>
+          </a:p>
+        </p:txBody>
+      </p:sp>
+      <p:sp>
+        <p:nvSpPr>
+          <p:cNvPr id="8" name="CuadroTexto 7">
+            <a:extLst>
+              <a:ext uri="{FF2B5EF4-FFF2-40B4-BE49-F238E27FC236}">
+                <a16:creationId xmlns:a16="http://schemas.microsoft.com/office/drawing/2014/main" id="{5E1119CC-F850-DEE7-7895-654B6A8380AA}"/>
+              </a:ext>
+            </a:extLst>
+          </p:cNvPr>
+          <p:cNvSpPr txBox="1"/>
+          <p:nvPr/>
+        </p:nvSpPr>
+        <p:spPr>
+          <a:xfrm>
+            <a:off x="1485900" y="836712"/>
+            <a:ext cx="8928992" cy="5909310"/>
+          </a:xfrm>
+          <a:prstGeom prst="rect">
+            <a:avLst/>
+          </a:prstGeom>
+          <a:noFill/>
+        </p:spPr>
+        <p:txBody>
+          <a:bodyPr wrap="square" rtlCol="0">
+            <a:spAutoFit/>
+          </a:bodyPr>
+          <a:lstStyle/>
+          <a:p>
+            <a:pPr algn="just"/>
+            <a:r>
+              <a:rPr lang="es-PE" b="1" dirty="0">
+                <a:solidFill>
+                  <a:schemeClr val="accent1">
+                    <a:lumMod val="75000"/>
+                  </a:schemeClr>
+                </a:solidFill>
+                <a:effectLst>
+                  <a:outerShdw blurRad="38100" dist="38100" dir="2700000" algn="tl">
+                    <a:srgbClr val="000000">
+                      <a:alpha val="43137"/>
+                    </a:srgbClr>
+                  </a:outerShdw>
+                </a:effectLst>
+                <a:latin typeface="Calibri" panose="020F0502020204030204" pitchFamily="34" charset="0"/>
+                <a:cs typeface="Calibri" panose="020F0502020204030204" pitchFamily="34" charset="0"/>
+                <a:sym typeface="Wingdings" panose="05000000000000000000" pitchFamily="2" charset="2"/>
+              </a:rPr>
+              <a:t>USUARIO DE GIT</a:t>
+            </a:r>
+            <a:endParaRPr lang="es-PE" dirty="0">
+              <a:solidFill>
+                <a:schemeClr val="tx2"/>
+              </a:solidFill>
+              <a:effectLst>
+                <a:outerShdw blurRad="38100" dist="38100" dir="2700000" algn="tl">
+                  <a:srgbClr val="000000">
+                    <a:alpha val="43137"/>
+                  </a:srgbClr>
+                </a:outerShdw>
+              </a:effectLst>
+              <a:latin typeface="Calibri" panose="020F0502020204030204" pitchFamily="34" charset="0"/>
+              <a:cs typeface="Calibri" panose="020F0502020204030204" pitchFamily="34" charset="0"/>
+            </a:endParaRPr>
+          </a:p>
+          <a:p>
+            <a:pPr marL="285750" indent="-285750" algn="just">
+              <a:buFont typeface="Arial" panose="020B0604020202020204" pitchFamily="34" charset="0"/>
+              <a:buChar char="•"/>
+            </a:pPr>
+            <a:r>
+              <a:rPr lang="es-PE" i="1" dirty="0">
+                <a:solidFill>
+                  <a:schemeClr val="tx2"/>
+                </a:solidFill>
+                <a:effectLst>
+                  <a:outerShdw blurRad="38100" dist="38100" dir="2700000" algn="tl">
+                    <a:srgbClr val="000000">
+                      <a:alpha val="43137"/>
+                    </a:srgbClr>
+                  </a:outerShdw>
+                </a:effectLst>
+                <a:latin typeface="Calibri" panose="020F0502020204030204" pitchFamily="34" charset="0"/>
+                <a:cs typeface="Calibri" panose="020F0502020204030204" pitchFamily="34" charset="0"/>
+              </a:rPr>
+              <a:t>git config --global user.name </a:t>
+            </a:r>
+            <a:r>
+              <a:rPr lang="es-PE" i="1" dirty="0">
+                <a:solidFill>
+                  <a:srgbClr val="7030A0"/>
+                </a:solidFill>
+                <a:effectLst>
+                  <a:outerShdw blurRad="38100" dist="38100" dir="2700000" algn="tl">
+                    <a:srgbClr val="000000">
+                      <a:alpha val="43137"/>
+                    </a:srgbClr>
+                  </a:outerShdw>
+                </a:effectLst>
+                <a:latin typeface="Calibri" panose="020F0502020204030204" pitchFamily="34" charset="0"/>
+                <a:cs typeface="Calibri" panose="020F0502020204030204" pitchFamily="34" charset="0"/>
+              </a:rPr>
+              <a:t>"John Doe”</a:t>
+            </a:r>
+          </a:p>
+          <a:p>
+            <a:pPr marL="285750" indent="-285750" algn="just">
+              <a:buFont typeface="Arial" panose="020B0604020202020204" pitchFamily="34" charset="0"/>
+              <a:buChar char="•"/>
+            </a:pPr>
+            <a:endParaRPr lang="es-PE" dirty="0">
+              <a:solidFill>
+                <a:schemeClr val="tx2"/>
+              </a:solidFill>
+              <a:latin typeface="Calibri" panose="020F0502020204030204" pitchFamily="34" charset="0"/>
+              <a:cs typeface="Calibri" panose="020F0502020204030204" pitchFamily="34" charset="0"/>
+            </a:endParaRPr>
+          </a:p>
+          <a:p>
+            <a:pPr algn="just"/>
+            <a:r>
+              <a:rPr lang="es-PE" b="1" dirty="0">
+                <a:solidFill>
+                  <a:schemeClr val="accent1">
+                    <a:lumMod val="75000"/>
+                  </a:schemeClr>
+                </a:solidFill>
+                <a:effectLst>
+                  <a:outerShdw blurRad="38100" dist="38100" dir="2700000" algn="tl">
+                    <a:srgbClr val="000000">
+                      <a:alpha val="43137"/>
+                    </a:srgbClr>
+                  </a:outerShdw>
+                </a:effectLst>
+                <a:latin typeface="Calibri" panose="020F0502020204030204" pitchFamily="34" charset="0"/>
+                <a:cs typeface="Calibri" panose="020F0502020204030204" pitchFamily="34" charset="0"/>
+                <a:sym typeface="Wingdings" panose="05000000000000000000" pitchFamily="2" charset="2"/>
+              </a:rPr>
+              <a:t>CORREO DE GIT</a:t>
+            </a:r>
+            <a:endParaRPr lang="es-PE" dirty="0">
+              <a:solidFill>
+                <a:schemeClr val="tx2"/>
+              </a:solidFill>
+              <a:effectLst>
+                <a:outerShdw blurRad="38100" dist="38100" dir="2700000" algn="tl">
+                  <a:srgbClr val="000000">
+                    <a:alpha val="43137"/>
+                  </a:srgbClr>
+                </a:outerShdw>
+              </a:effectLst>
+              <a:latin typeface="Calibri" panose="020F0502020204030204" pitchFamily="34" charset="0"/>
+              <a:cs typeface="Calibri" panose="020F0502020204030204" pitchFamily="34" charset="0"/>
+            </a:endParaRPr>
+          </a:p>
+          <a:p>
+            <a:pPr marL="285750" indent="-285750" algn="just">
+              <a:buFont typeface="Arial" panose="020B0604020202020204" pitchFamily="34" charset="0"/>
+              <a:buChar char="•"/>
+            </a:pPr>
+            <a:r>
+              <a:rPr lang="es-PE" i="1" dirty="0">
+                <a:solidFill>
+                  <a:schemeClr val="tx2"/>
+                </a:solidFill>
+                <a:effectLst>
+                  <a:outerShdw blurRad="38100" dist="38100" dir="2700000" algn="tl">
+                    <a:srgbClr val="000000">
+                      <a:alpha val="43137"/>
+                    </a:srgbClr>
+                  </a:outerShdw>
+                </a:effectLst>
+                <a:latin typeface="Calibri" panose="020F0502020204030204" pitchFamily="34" charset="0"/>
+                <a:cs typeface="Calibri" panose="020F0502020204030204" pitchFamily="34" charset="0"/>
+              </a:rPr>
+              <a:t>git config --global user.email </a:t>
+            </a:r>
+            <a:r>
+              <a:rPr lang="es-PE" i="1" dirty="0">
+                <a:solidFill>
+                  <a:srgbClr val="7030A0"/>
+                </a:solidFill>
+                <a:effectLst>
+                  <a:outerShdw blurRad="38100" dist="38100" dir="2700000" algn="tl">
+                    <a:srgbClr val="000000">
+                      <a:alpha val="43137"/>
+                    </a:srgbClr>
+                  </a:outerShdw>
+                </a:effectLst>
+                <a:latin typeface="Calibri" panose="020F0502020204030204" pitchFamily="34" charset="0"/>
+                <a:cs typeface="Calibri" panose="020F0502020204030204" pitchFamily="34" charset="0"/>
+                <a:hlinkClick r:id="rId3">
+                  <a:extLst>
+                    <a:ext uri="{A12FA001-AC4F-418D-AE19-62706E023703}">
+                      <ahyp:hlinkClr xmlns:ahyp="http://schemas.microsoft.com/office/drawing/2018/hyperlinkcolor" val="tx"/>
+                    </a:ext>
+                  </a:extLst>
+                </a:hlinkClick>
+              </a:rPr>
+              <a:t>johndoe@example.com</a:t>
+            </a:r>
+            <a:endParaRPr lang="es-PE" dirty="0">
+              <a:solidFill>
+                <a:schemeClr val="accent1">
+                  <a:lumMod val="75000"/>
+                </a:schemeClr>
+              </a:solidFill>
+              <a:latin typeface="Calibri" panose="020F0502020204030204" pitchFamily="34" charset="0"/>
+              <a:cs typeface="Calibri" panose="020F0502020204030204" pitchFamily="34" charset="0"/>
+              <a:sym typeface="Wingdings" panose="05000000000000000000" pitchFamily="2" charset="2"/>
+            </a:endParaRPr>
+          </a:p>
+          <a:p>
+            <a:pPr marL="285750" indent="-285750" algn="just">
+              <a:buFont typeface="Arial" panose="020B0604020202020204" pitchFamily="34" charset="0"/>
+              <a:buChar char="•"/>
+            </a:pPr>
+            <a:endParaRPr lang="es-PE" dirty="0">
+              <a:solidFill>
+                <a:schemeClr val="accent1">
+                  <a:lumMod val="75000"/>
+                </a:schemeClr>
+              </a:solidFill>
+              <a:latin typeface="Calibri" panose="020F0502020204030204" pitchFamily="34" charset="0"/>
+              <a:cs typeface="Calibri" panose="020F0502020204030204" pitchFamily="34" charset="0"/>
+              <a:sym typeface="Wingdings" panose="05000000000000000000" pitchFamily="2" charset="2"/>
+            </a:endParaRPr>
+          </a:p>
+          <a:p>
+            <a:pPr algn="just"/>
+            <a:r>
+              <a:rPr lang="es-PE" b="1" dirty="0">
+                <a:solidFill>
+                  <a:schemeClr val="accent1">
+                    <a:lumMod val="75000"/>
+                  </a:schemeClr>
+                </a:solidFill>
+                <a:effectLst>
+                  <a:outerShdw blurRad="38100" dist="38100" dir="2700000" algn="tl">
+                    <a:srgbClr val="000000">
+                      <a:alpha val="43137"/>
+                    </a:srgbClr>
+                  </a:outerShdw>
+                </a:effectLst>
+                <a:latin typeface="Calibri" panose="020F0502020204030204" pitchFamily="34" charset="0"/>
+                <a:cs typeface="Calibri" panose="020F0502020204030204" pitchFamily="34" charset="0"/>
+                <a:sym typeface="Wingdings" panose="05000000000000000000" pitchFamily="2" charset="2"/>
+              </a:rPr>
+              <a:t>EDITOR DE TEXTO</a:t>
+            </a:r>
+          </a:p>
+          <a:p>
+            <a:pPr marL="285750" indent="-285750" algn="just">
+              <a:buFont typeface="Arial" panose="020B0604020202020204" pitchFamily="34" charset="0"/>
+              <a:buChar char="•"/>
+            </a:pPr>
+            <a:r>
+              <a:rPr lang="es-PE" i="1" dirty="0">
+                <a:solidFill>
+                  <a:schemeClr val="tx2"/>
+                </a:solidFill>
+                <a:effectLst>
+                  <a:outerShdw blurRad="38100" dist="38100" dir="2700000" algn="tl">
+                    <a:srgbClr val="000000">
+                      <a:alpha val="43137"/>
+                    </a:srgbClr>
+                  </a:outerShdw>
+                </a:effectLst>
+                <a:latin typeface="Calibri" panose="020F0502020204030204" pitchFamily="34" charset="0"/>
+                <a:cs typeface="Calibri" panose="020F0502020204030204" pitchFamily="34" charset="0"/>
+                <a:sym typeface="Wingdings" panose="05000000000000000000" pitchFamily="2" charset="2"/>
+              </a:rPr>
+              <a:t>git config --global core.editor </a:t>
+            </a:r>
+            <a:r>
+              <a:rPr lang="es-PE" i="1" dirty="0">
+                <a:solidFill>
+                  <a:srgbClr val="7030A0"/>
+                </a:solidFill>
+                <a:effectLst>
+                  <a:outerShdw blurRad="38100" dist="38100" dir="2700000" algn="tl">
+                    <a:srgbClr val="000000">
+                      <a:alpha val="43137"/>
+                    </a:srgbClr>
+                  </a:outerShdw>
+                </a:effectLst>
+                <a:latin typeface="Calibri" panose="020F0502020204030204" pitchFamily="34" charset="0"/>
+                <a:cs typeface="Calibri" panose="020F0502020204030204" pitchFamily="34" charset="0"/>
+                <a:sym typeface="Wingdings" panose="05000000000000000000" pitchFamily="2" charset="2"/>
+              </a:rPr>
+              <a:t>emacs  </a:t>
+            </a:r>
+            <a:r>
+              <a:rPr lang="es-PE" i="1" dirty="0">
+                <a:solidFill>
+                  <a:schemeClr val="accent1">
+                    <a:lumMod val="75000"/>
+                  </a:schemeClr>
+                </a:solidFill>
+                <a:effectLst>
+                  <a:outerShdw blurRad="38100" dist="38100" dir="2700000" algn="tl">
+                    <a:srgbClr val="000000">
+                      <a:alpha val="43137"/>
+                    </a:srgbClr>
+                  </a:outerShdw>
+                </a:effectLst>
+                <a:latin typeface="Calibri" panose="020F0502020204030204" pitchFamily="34" charset="0"/>
+                <a:cs typeface="Calibri" panose="020F0502020204030204" pitchFamily="34" charset="0"/>
+                <a:sym typeface="Wingdings" panose="05000000000000000000" pitchFamily="2" charset="2"/>
+              </a:rPr>
+              <a:t>(Editor Emacs)</a:t>
+            </a:r>
+          </a:p>
+          <a:p>
+            <a:pPr marL="285750" indent="-285750" algn="just">
+              <a:buFont typeface="Arial" panose="020B0604020202020204" pitchFamily="34" charset="0"/>
+              <a:buChar char="•"/>
+            </a:pPr>
+            <a:r>
+              <a:rPr lang="es-PE" i="1" dirty="0">
+                <a:solidFill>
+                  <a:schemeClr val="tx2"/>
+                </a:solidFill>
+                <a:effectLst>
+                  <a:outerShdw blurRad="38100" dist="38100" dir="2700000" algn="tl">
+                    <a:srgbClr val="000000">
+                      <a:alpha val="43137"/>
+                    </a:srgbClr>
+                  </a:outerShdw>
+                </a:effectLst>
+                <a:latin typeface="Calibri" panose="020F0502020204030204" pitchFamily="34" charset="0"/>
+                <a:cs typeface="Calibri" panose="020F0502020204030204" pitchFamily="34" charset="0"/>
+                <a:sym typeface="Wingdings" panose="05000000000000000000" pitchFamily="2" charset="2"/>
+              </a:rPr>
+              <a:t>git config --global core.editor </a:t>
+            </a:r>
+            <a:r>
+              <a:rPr lang="es-PE" i="1" dirty="0">
+                <a:solidFill>
+                  <a:srgbClr val="7030A0"/>
+                </a:solidFill>
+                <a:effectLst>
+                  <a:outerShdw blurRad="38100" dist="38100" dir="2700000" algn="tl">
+                    <a:srgbClr val="000000">
+                      <a:alpha val="43137"/>
+                    </a:srgbClr>
+                  </a:outerShdw>
+                </a:effectLst>
+                <a:latin typeface="Calibri" panose="020F0502020204030204" pitchFamily="34" charset="0"/>
+                <a:cs typeface="Calibri" panose="020F0502020204030204" pitchFamily="34" charset="0"/>
+                <a:sym typeface="Wingdings" panose="05000000000000000000" pitchFamily="2" charset="2"/>
+              </a:rPr>
+              <a:t>"code --wait“ </a:t>
+            </a:r>
+            <a:r>
+              <a:rPr lang="es-PE" i="1" dirty="0">
+                <a:solidFill>
+                  <a:schemeClr val="accent1">
+                    <a:lumMod val="75000"/>
+                  </a:schemeClr>
+                </a:solidFill>
+                <a:effectLst>
+                  <a:outerShdw blurRad="38100" dist="38100" dir="2700000" algn="tl">
+                    <a:srgbClr val="000000">
+                      <a:alpha val="43137"/>
+                    </a:srgbClr>
+                  </a:outerShdw>
+                </a:effectLst>
+                <a:latin typeface="Calibri" panose="020F0502020204030204" pitchFamily="34" charset="0"/>
+                <a:cs typeface="Calibri" panose="020F0502020204030204" pitchFamily="34" charset="0"/>
+                <a:sym typeface="Wingdings" panose="05000000000000000000" pitchFamily="2" charset="2"/>
+              </a:rPr>
+              <a:t>(Editor Visual Studio Code)</a:t>
+            </a:r>
+          </a:p>
+          <a:p>
+            <a:pPr marL="285750" indent="-285750" algn="just">
+              <a:buFont typeface="Arial" panose="020B0604020202020204" pitchFamily="34" charset="0"/>
+              <a:buChar char="•"/>
+            </a:pPr>
+            <a:r>
+              <a:rPr lang="es-PE" i="1" dirty="0">
+                <a:solidFill>
+                  <a:schemeClr val="tx2"/>
+                </a:solidFill>
+                <a:effectLst>
+                  <a:outerShdw blurRad="38100" dist="38100" dir="2700000" algn="tl">
+                    <a:srgbClr val="000000">
+                      <a:alpha val="43137"/>
+                    </a:srgbClr>
+                  </a:outerShdw>
+                </a:effectLst>
+                <a:latin typeface="Calibri" panose="020F0502020204030204" pitchFamily="34" charset="0"/>
+                <a:cs typeface="Calibri" panose="020F0502020204030204" pitchFamily="34" charset="0"/>
+                <a:sym typeface="Wingdings" panose="05000000000000000000" pitchFamily="2" charset="2"/>
+              </a:rPr>
+              <a:t>git config --global core.editor </a:t>
+            </a:r>
+            <a:r>
+              <a:rPr lang="es-PE" i="1" dirty="0">
+                <a:solidFill>
+                  <a:srgbClr val="7030A0"/>
+                </a:solidFill>
+                <a:effectLst>
+                  <a:outerShdw blurRad="38100" dist="38100" dir="2700000" algn="tl">
+                    <a:srgbClr val="000000">
+                      <a:alpha val="43137"/>
+                    </a:srgbClr>
+                  </a:outerShdw>
+                </a:effectLst>
+                <a:latin typeface="Calibri" panose="020F0502020204030204" pitchFamily="34" charset="0"/>
+                <a:cs typeface="Calibri" panose="020F0502020204030204" pitchFamily="34" charset="0"/>
+                <a:sym typeface="Wingdings" panose="05000000000000000000" pitchFamily="2" charset="2"/>
+              </a:rPr>
+              <a:t>"'C:/</a:t>
+            </a:r>
+            <a:r>
+              <a:rPr lang="es-PE" i="1" dirty="0" err="1">
+                <a:solidFill>
+                  <a:srgbClr val="7030A0"/>
+                </a:solidFill>
+                <a:effectLst>
+                  <a:outerShdw blurRad="38100" dist="38100" dir="2700000" algn="tl">
+                    <a:srgbClr val="000000">
+                      <a:alpha val="43137"/>
+                    </a:srgbClr>
+                  </a:outerShdw>
+                </a:effectLst>
+                <a:latin typeface="Calibri" panose="020F0502020204030204" pitchFamily="34" charset="0"/>
+                <a:cs typeface="Calibri" panose="020F0502020204030204" pitchFamily="34" charset="0"/>
+                <a:sym typeface="Wingdings" panose="05000000000000000000" pitchFamily="2" charset="2"/>
+              </a:rPr>
+              <a:t>Program</a:t>
+            </a:r>
+            <a:r>
+              <a:rPr lang="es-PE" i="1" dirty="0">
+                <a:solidFill>
+                  <a:srgbClr val="7030A0"/>
+                </a:solidFill>
+                <a:effectLst>
+                  <a:outerShdw blurRad="38100" dist="38100" dir="2700000" algn="tl">
+                    <a:srgbClr val="000000">
+                      <a:alpha val="43137"/>
+                    </a:srgbClr>
+                  </a:outerShdw>
+                </a:effectLst>
+                <a:latin typeface="Calibri" panose="020F0502020204030204" pitchFamily="34" charset="0"/>
+                <a:cs typeface="Calibri" panose="020F0502020204030204" pitchFamily="34" charset="0"/>
+                <a:sym typeface="Wingdings" panose="05000000000000000000" pitchFamily="2" charset="2"/>
+              </a:rPr>
+              <a:t> Files (x86)/Notepad++/</a:t>
+            </a:r>
+            <a:r>
+              <a:rPr lang="es-PE" i="1" dirty="0" err="1">
+                <a:solidFill>
+                  <a:srgbClr val="7030A0"/>
+                </a:solidFill>
+                <a:effectLst>
+                  <a:outerShdw blurRad="38100" dist="38100" dir="2700000" algn="tl">
+                    <a:srgbClr val="000000">
+                      <a:alpha val="43137"/>
+                    </a:srgbClr>
+                  </a:outerShdw>
+                </a:effectLst>
+                <a:latin typeface="Calibri" panose="020F0502020204030204" pitchFamily="34" charset="0"/>
+                <a:cs typeface="Calibri" panose="020F0502020204030204" pitchFamily="34" charset="0"/>
+                <a:sym typeface="Wingdings" panose="05000000000000000000" pitchFamily="2" charset="2"/>
+              </a:rPr>
+              <a:t>notepad</a:t>
+            </a:r>
+            <a:r>
+              <a:rPr lang="es-PE" i="1" dirty="0">
+                <a:solidFill>
+                  <a:srgbClr val="7030A0"/>
+                </a:solidFill>
+                <a:effectLst>
+                  <a:outerShdw blurRad="38100" dist="38100" dir="2700000" algn="tl">
+                    <a:srgbClr val="000000">
+                      <a:alpha val="43137"/>
+                    </a:srgbClr>
+                  </a:outerShdw>
+                </a:effectLst>
+                <a:latin typeface="Calibri" panose="020F0502020204030204" pitchFamily="34" charset="0"/>
+                <a:cs typeface="Calibri" panose="020F0502020204030204" pitchFamily="34" charset="0"/>
+                <a:sym typeface="Wingdings" panose="05000000000000000000" pitchFamily="2" charset="2"/>
+              </a:rPr>
+              <a:t>++.exe' -</a:t>
+            </a:r>
+            <a:r>
+              <a:rPr lang="es-PE" i="1" dirty="0" err="1">
+                <a:solidFill>
+                  <a:srgbClr val="7030A0"/>
+                </a:solidFill>
+                <a:effectLst>
+                  <a:outerShdw blurRad="38100" dist="38100" dir="2700000" algn="tl">
+                    <a:srgbClr val="000000">
+                      <a:alpha val="43137"/>
+                    </a:srgbClr>
+                  </a:outerShdw>
+                </a:effectLst>
+                <a:latin typeface="Calibri" panose="020F0502020204030204" pitchFamily="34" charset="0"/>
+                <a:cs typeface="Calibri" panose="020F0502020204030204" pitchFamily="34" charset="0"/>
+                <a:sym typeface="Wingdings" panose="05000000000000000000" pitchFamily="2" charset="2"/>
+              </a:rPr>
+              <a:t>multiInst</a:t>
+            </a:r>
+            <a:r>
+              <a:rPr lang="es-PE" i="1" dirty="0">
+                <a:solidFill>
+                  <a:srgbClr val="7030A0"/>
+                </a:solidFill>
+                <a:effectLst>
+                  <a:outerShdw blurRad="38100" dist="38100" dir="2700000" algn="tl">
+                    <a:srgbClr val="000000">
+                      <a:alpha val="43137"/>
+                    </a:srgbClr>
+                  </a:outerShdw>
+                </a:effectLst>
+                <a:latin typeface="Calibri" panose="020F0502020204030204" pitchFamily="34" charset="0"/>
+                <a:cs typeface="Calibri" panose="020F0502020204030204" pitchFamily="34" charset="0"/>
+                <a:sym typeface="Wingdings" panose="05000000000000000000" pitchFamily="2" charset="2"/>
+              </a:rPr>
+              <a:t> -</a:t>
+            </a:r>
+            <a:r>
+              <a:rPr lang="es-PE" i="1" dirty="0" err="1">
+                <a:solidFill>
+                  <a:srgbClr val="7030A0"/>
+                </a:solidFill>
+                <a:effectLst>
+                  <a:outerShdw blurRad="38100" dist="38100" dir="2700000" algn="tl">
+                    <a:srgbClr val="000000">
+                      <a:alpha val="43137"/>
+                    </a:srgbClr>
+                  </a:outerShdw>
+                </a:effectLst>
+                <a:latin typeface="Calibri" panose="020F0502020204030204" pitchFamily="34" charset="0"/>
+                <a:cs typeface="Calibri" panose="020F0502020204030204" pitchFamily="34" charset="0"/>
+                <a:sym typeface="Wingdings" panose="05000000000000000000" pitchFamily="2" charset="2"/>
+              </a:rPr>
+              <a:t>notabbar</a:t>
+            </a:r>
+            <a:r>
+              <a:rPr lang="es-PE" i="1" dirty="0">
+                <a:solidFill>
+                  <a:srgbClr val="7030A0"/>
+                </a:solidFill>
+                <a:effectLst>
+                  <a:outerShdw blurRad="38100" dist="38100" dir="2700000" algn="tl">
+                    <a:srgbClr val="000000">
+                      <a:alpha val="43137"/>
+                    </a:srgbClr>
+                  </a:outerShdw>
+                </a:effectLst>
+                <a:latin typeface="Calibri" panose="020F0502020204030204" pitchFamily="34" charset="0"/>
+                <a:cs typeface="Calibri" panose="020F0502020204030204" pitchFamily="34" charset="0"/>
+                <a:sym typeface="Wingdings" panose="05000000000000000000" pitchFamily="2" charset="2"/>
+              </a:rPr>
+              <a:t> -</a:t>
+            </a:r>
+            <a:r>
+              <a:rPr lang="es-PE" i="1" dirty="0" err="1">
+                <a:solidFill>
+                  <a:srgbClr val="7030A0"/>
+                </a:solidFill>
+                <a:effectLst>
+                  <a:outerShdw blurRad="38100" dist="38100" dir="2700000" algn="tl">
+                    <a:srgbClr val="000000">
+                      <a:alpha val="43137"/>
+                    </a:srgbClr>
+                  </a:outerShdw>
+                </a:effectLst>
+                <a:latin typeface="Calibri" panose="020F0502020204030204" pitchFamily="34" charset="0"/>
+                <a:cs typeface="Calibri" panose="020F0502020204030204" pitchFamily="34" charset="0"/>
+                <a:sym typeface="Wingdings" panose="05000000000000000000" pitchFamily="2" charset="2"/>
+              </a:rPr>
+              <a:t>nosession</a:t>
+            </a:r>
+            <a:r>
+              <a:rPr lang="es-PE" i="1" dirty="0">
+                <a:solidFill>
+                  <a:srgbClr val="7030A0"/>
+                </a:solidFill>
+                <a:effectLst>
+                  <a:outerShdw blurRad="38100" dist="38100" dir="2700000" algn="tl">
+                    <a:srgbClr val="000000">
+                      <a:alpha val="43137"/>
+                    </a:srgbClr>
+                  </a:outerShdw>
+                </a:effectLst>
+                <a:latin typeface="Calibri" panose="020F0502020204030204" pitchFamily="34" charset="0"/>
+                <a:cs typeface="Calibri" panose="020F0502020204030204" pitchFamily="34" charset="0"/>
+                <a:sym typeface="Wingdings" panose="05000000000000000000" pitchFamily="2" charset="2"/>
+              </a:rPr>
+              <a:t> -</a:t>
+            </a:r>
+            <a:r>
+              <a:rPr lang="es-PE" i="1" dirty="0" err="1">
+                <a:solidFill>
+                  <a:srgbClr val="7030A0"/>
+                </a:solidFill>
+                <a:effectLst>
+                  <a:outerShdw blurRad="38100" dist="38100" dir="2700000" algn="tl">
+                    <a:srgbClr val="000000">
+                      <a:alpha val="43137"/>
+                    </a:srgbClr>
+                  </a:outerShdw>
+                </a:effectLst>
+                <a:latin typeface="Calibri" panose="020F0502020204030204" pitchFamily="34" charset="0"/>
+                <a:cs typeface="Calibri" panose="020F0502020204030204" pitchFamily="34" charset="0"/>
+                <a:sym typeface="Wingdings" panose="05000000000000000000" pitchFamily="2" charset="2"/>
+              </a:rPr>
+              <a:t>noPlugin</a:t>
+            </a:r>
+            <a:r>
+              <a:rPr lang="es-PE" i="1" dirty="0">
+                <a:solidFill>
+                  <a:srgbClr val="7030A0"/>
+                </a:solidFill>
+                <a:effectLst>
+                  <a:outerShdw blurRad="38100" dist="38100" dir="2700000" algn="tl">
+                    <a:srgbClr val="000000">
+                      <a:alpha val="43137"/>
+                    </a:srgbClr>
+                  </a:outerShdw>
+                </a:effectLst>
+                <a:latin typeface="Calibri" panose="020F0502020204030204" pitchFamily="34" charset="0"/>
+                <a:cs typeface="Calibri" panose="020F0502020204030204" pitchFamily="34" charset="0"/>
+                <a:sym typeface="Wingdings" panose="05000000000000000000" pitchFamily="2" charset="2"/>
+              </a:rPr>
+              <a:t>“ </a:t>
+            </a:r>
+            <a:r>
+              <a:rPr lang="es-PE" i="1" dirty="0">
+                <a:solidFill>
+                  <a:schemeClr val="accent1">
+                    <a:lumMod val="75000"/>
+                  </a:schemeClr>
+                </a:solidFill>
+                <a:effectLst>
+                  <a:outerShdw blurRad="38100" dist="38100" dir="2700000" algn="tl">
+                    <a:srgbClr val="000000">
+                      <a:alpha val="43137"/>
+                    </a:srgbClr>
+                  </a:outerShdw>
+                </a:effectLst>
+                <a:latin typeface="Calibri" panose="020F0502020204030204" pitchFamily="34" charset="0"/>
+                <a:cs typeface="Calibri" panose="020F0502020204030204" pitchFamily="34" charset="0"/>
+                <a:sym typeface="Wingdings" panose="05000000000000000000" pitchFamily="2" charset="2"/>
+              </a:rPr>
+              <a:t>(Editor Notepad++)</a:t>
+            </a:r>
+            <a:endParaRPr lang="es-PE" i="1" dirty="0">
+              <a:solidFill>
+                <a:srgbClr val="7030A0"/>
+              </a:solidFill>
+              <a:effectLst>
+                <a:outerShdw blurRad="38100" dist="38100" dir="2700000" algn="tl">
+                  <a:srgbClr val="000000">
+                    <a:alpha val="43137"/>
+                  </a:srgbClr>
+                </a:outerShdw>
+              </a:effectLst>
+              <a:latin typeface="Calibri" panose="020F0502020204030204" pitchFamily="34" charset="0"/>
+              <a:cs typeface="Calibri" panose="020F0502020204030204" pitchFamily="34" charset="0"/>
+              <a:sym typeface="Wingdings" panose="05000000000000000000" pitchFamily="2" charset="2"/>
+            </a:endParaRPr>
+          </a:p>
+          <a:p>
+            <a:pPr algn="just"/>
+            <a:endParaRPr lang="es-PE" dirty="0">
+              <a:solidFill>
+                <a:schemeClr val="tx2"/>
+              </a:solidFill>
+              <a:latin typeface="Calibri" panose="020F0502020204030204" pitchFamily="34" charset="0"/>
+              <a:cs typeface="Calibri" panose="020F0502020204030204" pitchFamily="34" charset="0"/>
+            </a:endParaRPr>
+          </a:p>
+          <a:p>
+            <a:pPr algn="just"/>
+            <a:r>
+              <a:rPr lang="es-PE" b="1" dirty="0">
+                <a:solidFill>
+                  <a:schemeClr val="accent1">
+                    <a:lumMod val="75000"/>
+                  </a:schemeClr>
+                </a:solidFill>
+                <a:effectLst>
+                  <a:outerShdw blurRad="38100" dist="38100" dir="2700000" algn="tl">
+                    <a:srgbClr val="000000">
+                      <a:alpha val="43137"/>
+                    </a:srgbClr>
+                  </a:outerShdw>
+                </a:effectLst>
+                <a:latin typeface="Calibri" panose="020F0502020204030204" pitchFamily="34" charset="0"/>
+                <a:cs typeface="Calibri" panose="020F0502020204030204" pitchFamily="34" charset="0"/>
+                <a:sym typeface="Wingdings" panose="05000000000000000000" pitchFamily="2" charset="2"/>
+              </a:rPr>
+              <a:t>VERIFICANDO LA CONFIGURACIÓN DEL GIT</a:t>
+            </a:r>
+            <a:endParaRPr lang="es-PE" dirty="0">
+              <a:solidFill>
+                <a:schemeClr val="tx2"/>
+              </a:solidFill>
+              <a:effectLst>
+                <a:outerShdw blurRad="38100" dist="38100" dir="2700000" algn="tl">
+                  <a:srgbClr val="000000">
+                    <a:alpha val="43137"/>
+                  </a:srgbClr>
+                </a:outerShdw>
+              </a:effectLst>
+              <a:latin typeface="Calibri" panose="020F0502020204030204" pitchFamily="34" charset="0"/>
+              <a:cs typeface="Calibri" panose="020F0502020204030204" pitchFamily="34" charset="0"/>
+            </a:endParaRPr>
+          </a:p>
+          <a:p>
+            <a:pPr marL="285750" indent="-285750" algn="just">
+              <a:buFont typeface="Arial" panose="020B0604020202020204" pitchFamily="34" charset="0"/>
+              <a:buChar char="•"/>
+            </a:pPr>
+            <a:r>
+              <a:rPr lang="es-PE" i="1" dirty="0">
+                <a:solidFill>
+                  <a:schemeClr val="tx2"/>
+                </a:solidFill>
+                <a:effectLst>
+                  <a:outerShdw blurRad="38100" dist="38100" dir="2700000" algn="tl">
+                    <a:srgbClr val="000000">
+                      <a:alpha val="43137"/>
+                    </a:srgbClr>
+                  </a:outerShdw>
+                </a:effectLst>
+                <a:latin typeface="Calibri" panose="020F0502020204030204" pitchFamily="34" charset="0"/>
+                <a:cs typeface="Calibri" panose="020F0502020204030204" pitchFamily="34" charset="0"/>
+              </a:rPr>
+              <a:t>git config –list</a:t>
+            </a:r>
+          </a:p>
+          <a:p>
+            <a:pPr marL="285750" indent="-285750" algn="just">
+              <a:buFont typeface="Arial" panose="020B0604020202020204" pitchFamily="34" charset="0"/>
+              <a:buChar char="•"/>
+            </a:pPr>
+            <a:endParaRPr lang="es-PE" i="1" dirty="0">
+              <a:solidFill>
+                <a:schemeClr val="tx2"/>
+              </a:solidFill>
+              <a:effectLst>
+                <a:outerShdw blurRad="38100" dist="38100" dir="2700000" algn="tl">
+                  <a:srgbClr val="000000">
+                    <a:alpha val="43137"/>
+                  </a:srgbClr>
+                </a:outerShdw>
+              </a:effectLst>
+              <a:latin typeface="Calibri" panose="020F0502020204030204" pitchFamily="34" charset="0"/>
+              <a:cs typeface="Calibri" panose="020F0502020204030204" pitchFamily="34" charset="0"/>
+              <a:sym typeface="Wingdings" panose="05000000000000000000" pitchFamily="2" charset="2"/>
+            </a:endParaRPr>
+          </a:p>
+          <a:p>
+            <a:pPr algn="just"/>
+            <a:r>
+              <a:rPr lang="es-PE" b="1" dirty="0">
+                <a:solidFill>
+                  <a:schemeClr val="accent1">
+                    <a:lumMod val="75000"/>
+                  </a:schemeClr>
+                </a:solidFill>
+                <a:effectLst>
+                  <a:outerShdw blurRad="38100" dist="38100" dir="2700000" algn="tl">
+                    <a:srgbClr val="000000">
+                      <a:alpha val="43137"/>
+                    </a:srgbClr>
+                  </a:outerShdw>
+                </a:effectLst>
+                <a:latin typeface="Calibri" panose="020F0502020204030204" pitchFamily="34" charset="0"/>
+                <a:cs typeface="Calibri" panose="020F0502020204030204" pitchFamily="34" charset="0"/>
+                <a:sym typeface="Wingdings" panose="05000000000000000000" pitchFamily="2" charset="2"/>
+              </a:rPr>
+              <a:t>VERIFICANDO LA CONFIGURACIÓN A NIVEL DE PROPIEDADES</a:t>
+            </a:r>
+            <a:endParaRPr lang="es-PE" dirty="0">
+              <a:solidFill>
+                <a:schemeClr val="tx2"/>
+              </a:solidFill>
+              <a:effectLst>
+                <a:outerShdw blurRad="38100" dist="38100" dir="2700000" algn="tl">
+                  <a:srgbClr val="000000">
+                    <a:alpha val="43137"/>
+                  </a:srgbClr>
+                </a:outerShdw>
+              </a:effectLst>
+              <a:latin typeface="Calibri" panose="020F0502020204030204" pitchFamily="34" charset="0"/>
+              <a:cs typeface="Calibri" panose="020F0502020204030204" pitchFamily="34" charset="0"/>
+            </a:endParaRPr>
+          </a:p>
+          <a:p>
+            <a:pPr marL="285750" indent="-285750" algn="just">
+              <a:buFont typeface="Arial" panose="020B0604020202020204" pitchFamily="34" charset="0"/>
+              <a:buChar char="•"/>
+            </a:pPr>
+            <a:r>
+              <a:rPr lang="es-PE" i="1" dirty="0">
+                <a:solidFill>
+                  <a:schemeClr val="tx2"/>
+                </a:solidFill>
+                <a:effectLst>
+                  <a:outerShdw blurRad="38100" dist="38100" dir="2700000" algn="tl">
+                    <a:srgbClr val="000000">
+                      <a:alpha val="43137"/>
+                    </a:srgbClr>
+                  </a:outerShdw>
+                </a:effectLst>
+                <a:latin typeface="Calibri" panose="020F0502020204030204" pitchFamily="34" charset="0"/>
+                <a:cs typeface="Calibri" panose="020F0502020204030204" pitchFamily="34" charset="0"/>
+              </a:rPr>
+              <a:t>git config </a:t>
+            </a:r>
+            <a:r>
+              <a:rPr lang="es-PE" i="1" dirty="0">
+                <a:solidFill>
+                  <a:srgbClr val="7030A0"/>
+                </a:solidFill>
+                <a:effectLst>
+                  <a:outerShdw blurRad="38100" dist="38100" dir="2700000" algn="tl">
+                    <a:srgbClr val="000000">
+                      <a:alpha val="43137"/>
+                    </a:srgbClr>
+                  </a:outerShdw>
+                </a:effectLst>
+                <a:latin typeface="Calibri" panose="020F0502020204030204" pitchFamily="34" charset="0"/>
+                <a:cs typeface="Calibri" panose="020F0502020204030204" pitchFamily="34" charset="0"/>
+              </a:rPr>
+              <a:t>&lt;</a:t>
+            </a:r>
+            <a:r>
+              <a:rPr lang="es-PE" i="1" dirty="0" err="1">
+                <a:solidFill>
+                  <a:srgbClr val="7030A0"/>
+                </a:solidFill>
+                <a:effectLst>
+                  <a:outerShdw blurRad="38100" dist="38100" dir="2700000" algn="tl">
+                    <a:srgbClr val="000000">
+                      <a:alpha val="43137"/>
+                    </a:srgbClr>
+                  </a:outerShdw>
+                </a:effectLst>
+                <a:latin typeface="Calibri" panose="020F0502020204030204" pitchFamily="34" charset="0"/>
+                <a:cs typeface="Calibri" panose="020F0502020204030204" pitchFamily="34" charset="0"/>
+              </a:rPr>
+              <a:t>key</a:t>
+            </a:r>
+            <a:r>
+              <a:rPr lang="es-PE" i="1" dirty="0">
+                <a:solidFill>
+                  <a:srgbClr val="7030A0"/>
+                </a:solidFill>
+                <a:effectLst>
+                  <a:outerShdw blurRad="38100" dist="38100" dir="2700000" algn="tl">
+                    <a:srgbClr val="000000">
+                      <a:alpha val="43137"/>
+                    </a:srgbClr>
+                  </a:outerShdw>
+                </a:effectLst>
+                <a:latin typeface="Calibri" panose="020F0502020204030204" pitchFamily="34" charset="0"/>
+                <a:cs typeface="Calibri" panose="020F0502020204030204" pitchFamily="34" charset="0"/>
+              </a:rPr>
+              <a:t>&gt; </a:t>
+            </a:r>
+          </a:p>
+          <a:p>
+            <a:pPr marL="742950" lvl="1" indent="-285750" algn="just">
+              <a:buFont typeface="Courier New" panose="02070309020205020404" pitchFamily="49" charset="0"/>
+              <a:buChar char="o"/>
+            </a:pPr>
+            <a:r>
+              <a:rPr lang="es-PE" i="1" dirty="0">
+                <a:solidFill>
+                  <a:schemeClr val="tx2"/>
+                </a:solidFill>
+                <a:effectLst>
+                  <a:outerShdw blurRad="38100" dist="38100" dir="2700000" algn="tl">
+                    <a:srgbClr val="000000">
+                      <a:alpha val="43137"/>
+                    </a:srgbClr>
+                  </a:outerShdw>
+                </a:effectLst>
+                <a:latin typeface="Calibri" panose="020F0502020204030204" pitchFamily="34" charset="0"/>
+                <a:cs typeface="Calibri" panose="020F0502020204030204" pitchFamily="34" charset="0"/>
+                <a:sym typeface="Wingdings" panose="05000000000000000000" pitchFamily="2" charset="2"/>
+              </a:rPr>
+              <a:t>git config user.name</a:t>
+            </a:r>
+          </a:p>
+          <a:p>
+            <a:pPr marL="742950" lvl="1" indent="-285750" algn="just">
+              <a:buFont typeface="Courier New" panose="02070309020205020404" pitchFamily="49" charset="0"/>
+              <a:buChar char="o"/>
+            </a:pPr>
+            <a:r>
+              <a:rPr lang="es-PE" i="1" dirty="0">
+                <a:solidFill>
+                  <a:schemeClr val="tx2"/>
+                </a:solidFill>
+                <a:effectLst>
+                  <a:outerShdw blurRad="38100" dist="38100" dir="2700000" algn="tl">
+                    <a:srgbClr val="000000">
+                      <a:alpha val="43137"/>
+                    </a:srgbClr>
+                  </a:outerShdw>
+                </a:effectLst>
+                <a:latin typeface="Calibri" panose="020F0502020204030204" pitchFamily="34" charset="0"/>
+                <a:cs typeface="Calibri" panose="020F0502020204030204" pitchFamily="34" charset="0"/>
+                <a:sym typeface="Wingdings" panose="05000000000000000000" pitchFamily="2" charset="2"/>
+              </a:rPr>
+              <a:t>git config user.email</a:t>
+            </a:r>
+          </a:p>
+          <a:p>
+            <a:pPr marL="742950" lvl="1" indent="-285750" algn="just">
+              <a:buFont typeface="Arial" panose="020B0604020202020204" pitchFamily="34" charset="0"/>
+              <a:buChar char="•"/>
+            </a:pPr>
+            <a:endParaRPr lang="es-PE" i="1" dirty="0">
+              <a:solidFill>
+                <a:schemeClr val="tx2"/>
+              </a:solidFill>
+              <a:effectLst>
+                <a:outerShdw blurRad="38100" dist="38100" dir="2700000" algn="tl">
+                  <a:srgbClr val="000000">
+                    <a:alpha val="43137"/>
+                  </a:srgbClr>
+                </a:outerShdw>
+              </a:effectLst>
+              <a:latin typeface="Calibri" panose="020F0502020204030204" pitchFamily="34" charset="0"/>
+              <a:cs typeface="Calibri" panose="020F0502020204030204" pitchFamily="34" charset="0"/>
+              <a:sym typeface="Wingdings" panose="05000000000000000000" pitchFamily="2" charset="2"/>
+            </a:endParaRPr>
+          </a:p>
+          <a:p>
+            <a:pPr marL="285750" indent="-285750" algn="just">
+              <a:buFont typeface="Arial" panose="020B0604020202020204" pitchFamily="34" charset="0"/>
+              <a:buChar char="•"/>
+            </a:pPr>
+            <a:endParaRPr lang="es-PE" dirty="0">
+              <a:solidFill>
+                <a:schemeClr val="accent1">
+                  <a:lumMod val="75000"/>
+                </a:schemeClr>
+              </a:solidFill>
+              <a:latin typeface="Calibri" panose="020F0502020204030204" pitchFamily="34" charset="0"/>
+              <a:cs typeface="Calibri" panose="020F0502020204030204" pitchFamily="34" charset="0"/>
+              <a:sym typeface="Wingdings" panose="05000000000000000000" pitchFamily="2" charset="2"/>
+            </a:endParaRPr>
+          </a:p>
+        </p:txBody>
+      </p:sp>
+    </p:spTree>
+    <p:extLst>
+      <p:ext uri="{BB962C8B-B14F-4D97-AF65-F5344CB8AC3E}">
+        <p14:creationId xmlns:p14="http://schemas.microsoft.com/office/powerpoint/2010/main" val="3783327520"/>
+      </p:ext>
+    </p:extLst>
+  </p:cSld>
+  <p:clrMapOvr>
+    <a:masterClrMapping/>
+  </p:clrMapOvr>
+  <mc:AlternateContent xmlns:mc="http://schemas.openxmlformats.org/markup-compatibility/2006" xmlns:p14="http://schemas.microsoft.com/office/powerpoint/2010/main">
+    <mc:Choice Requires="p14">
+      <p:transition spd="med" p14:dur="700">
+        <p:fade/>
+      </p:transition>
+    </mc:Choice>
+    <mc:Fallback xmlns="">
+      <p:transition spd="med">
+        <p:fade/>
+      </p:transition>
+    </mc:Fallback>
+  </mc:AlternateContent>
+</p:sld>
+</file>
+
+<file path=ppt/slides/slide6.xml><?xml version="1.0" encoding="utf-8"?>
+<p:sld xmlns:a="http://schemas.openxmlformats.org/drawingml/2006/main" xmlns:r="http://schemas.openxmlformats.org/officeDocument/2006/relationships" xmlns:p="http://schemas.openxmlformats.org/presentationml/2006/main">
+  <p:cSld>
+    <p:spTree>
+      <p:nvGrpSpPr>
+        <p:cNvPr id="1" name=""/>
+        <p:cNvGrpSpPr/>
+        <p:nvPr/>
+      </p:nvGrpSpPr>
+      <p:grpSpPr>
+        <a:xfrm>
+          <a:off x="0" y="0"/>
+          <a:ext cx="0" cy="0"/>
+          <a:chOff x="0" y="0"/>
+          <a:chExt cx="0" cy="0"/>
+        </a:xfrm>
+      </p:grpSpPr>
+      <p:sp>
+        <p:nvSpPr>
           <p:cNvPr id="2" name="Título 1"/>
           <p:cNvSpPr>
             <a:spLocks noGrp="1"/>
@@ -16179,7 +17951,7 @@
             <a:pPr rtl="0"/>
             <a:fld id="{7DC1BBB0-96F0-4077-A278-0F3FB5C104D3}" type="slidenum">
               <a:rPr lang="es-ES" noProof="0" smtClean="0"/>
-              <a:t>5</a:t>
+              <a:t>6</a:t>
             </a:fld>
             <a:endParaRPr lang="es-ES" noProof="0" dirty="0"/>
           </a:p>
@@ -16257,7 +18029,7 @@
 </p:sld>
 </file>
 
-<file path=ppt/slides/slide6.xml><?xml version="1.0" encoding="utf-8"?>
+<file path=ppt/slides/slide7.xml><?xml version="1.0" encoding="utf-8"?>
 <p:sld xmlns:a="http://schemas.openxmlformats.org/drawingml/2006/main" xmlns:r="http://schemas.openxmlformats.org/officeDocument/2006/relationships" xmlns:p="http://schemas.openxmlformats.org/presentationml/2006/main">
   <p:cSld>
     <p:spTree>
@@ -16376,7 +18148,7 @@
             <a:pPr rtl="0"/>
             <a:fld id="{7DC1BBB0-96F0-4077-A278-0F3FB5C104D3}" type="slidenum">
               <a:rPr lang="es-ES" noProof="0" smtClean="0"/>
-              <a:t>6</a:t>
+              <a:t>7</a:t>
             </a:fld>
             <a:endParaRPr lang="es-ES" noProof="0" dirty="0"/>
           </a:p>
@@ -16407,7 +18179,7 @@
 </p:sld>
 </file>
 
-<file path=ppt/slides/slide7.xml><?xml version="1.0" encoding="utf-8"?>
+<file path=ppt/slides/slide8.xml><?xml version="1.0" encoding="utf-8"?>
 <p:sld xmlns:a="http://schemas.openxmlformats.org/drawingml/2006/main" xmlns:r="http://schemas.openxmlformats.org/officeDocument/2006/relationships" xmlns:p="http://schemas.openxmlformats.org/presentationml/2006/main">
   <p:cSld>
     <p:spTree>
@@ -16791,7 +18563,7 @@
             <a:pPr rtl="0"/>
             <a:fld id="{7DC1BBB0-96F0-4077-A278-0F3FB5C104D3}" type="slidenum">
               <a:rPr lang="es-ES" noProof="0" smtClean="0"/>
-              <a:t>7</a:t>
+              <a:t>8</a:t>
             </a:fld>
             <a:endParaRPr lang="es-ES" noProof="0" dirty="0"/>
           </a:p>
@@ -16801,198 +18573,6 @@
     <p:extLst>
       <p:ext uri="{BB962C8B-B14F-4D97-AF65-F5344CB8AC3E}">
         <p14:creationId xmlns:p14="http://schemas.microsoft.com/office/powerpoint/2010/main" val="2593339164"/>
-      </p:ext>
-    </p:extLst>
-  </p:cSld>
-  <p:clrMapOvr>
-    <a:masterClrMapping/>
-  </p:clrMapOvr>
-  <mc:AlternateContent xmlns:mc="http://schemas.openxmlformats.org/markup-compatibility/2006" xmlns:p14="http://schemas.microsoft.com/office/powerpoint/2010/main">
-    <mc:Choice Requires="p14">
-      <p:transition spd="med" p14:dur="700">
-        <p:fade/>
-      </p:transition>
-    </mc:Choice>
-    <mc:Fallback xmlns="">
-      <p:transition spd="med">
-        <p:fade/>
-      </p:transition>
-    </mc:Fallback>
-  </mc:AlternateContent>
-</p:sld>
-</file>
-
-<file path=ppt/slides/slide8.xml><?xml version="1.0" encoding="utf-8"?>
-<p:sld xmlns:a="http://schemas.openxmlformats.org/drawingml/2006/main" xmlns:r="http://schemas.openxmlformats.org/officeDocument/2006/relationships" xmlns:p="http://schemas.openxmlformats.org/presentationml/2006/main">
-  <p:cSld>
-    <p:spTree>
-      <p:nvGrpSpPr>
-        <p:cNvPr id="1" name=""/>
-        <p:cNvGrpSpPr/>
-        <p:nvPr/>
-      </p:nvGrpSpPr>
-      <p:grpSpPr>
-        <a:xfrm>
-          <a:off x="0" y="0"/>
-          <a:ext cx="0" cy="0"/>
-          <a:chOff x="0" y="0"/>
-          <a:chExt cx="0" cy="0"/>
-        </a:xfrm>
-      </p:grpSpPr>
-      <p:sp>
-        <p:nvSpPr>
-          <p:cNvPr id="2" name="Título 1"/>
-          <p:cNvSpPr>
-            <a:spLocks noGrp="1"/>
-          </p:cNvSpPr>
-          <p:nvPr>
-            <p:ph type="title"/>
-          </p:nvPr>
-        </p:nvSpPr>
-        <p:spPr/>
-        <p:txBody>
-          <a:bodyPr rtlCol="0"/>
-          <a:lstStyle/>
-          <a:p>
-            <a:pPr rtl="0"/>
-            <a:r>
-              <a:rPr lang="es-ES" dirty="0"/>
-              <a:t>Diseño de dos objetos con SmartArt</a:t>
-            </a:r>
-          </a:p>
-        </p:txBody>
-      </p:sp>
-      <p:graphicFrame>
-        <p:nvGraphicFramePr>
-          <p:cNvPr id="6" name="Marcador de posición de contenido 5" descr="Diagrama de lista vertical con botón de contenido adicional en el que se muestran tres grupos organizados uno debajo del otro con viñetas que indican las tareas de cada grupo."/>
-          <p:cNvGraphicFramePr>
-            <a:graphicFrameLocks noGrp="1"/>
-          </p:cNvGraphicFramePr>
-          <p:nvPr>
-            <p:ph sz="half" idx="1"/>
-            <p:extLst>
-              <p:ext uri="{D42A27DB-BD31-4B8C-83A1-F6EECF244321}">
-                <p14:modId xmlns:p14="http://schemas.microsoft.com/office/powerpoint/2010/main" val="3959688702"/>
-              </p:ext>
-            </p:extLst>
-          </p:nvPr>
-        </p:nvGraphicFramePr>
-        <p:xfrm>
-          <a:off x="1593850" y="1600200"/>
-          <a:ext cx="4814888" cy="4572000"/>
-        </p:xfrm>
-        <a:graphic>
-          <a:graphicData uri="http://schemas.openxmlformats.org/drawingml/2006/diagram">
-            <dgm:relIds xmlns:dgm="http://schemas.openxmlformats.org/drawingml/2006/diagram" xmlns:r="http://schemas.openxmlformats.org/officeDocument/2006/relationships" r:dm="rId3" r:lo="rId4" r:qs="rId5" r:cs="rId6"/>
-          </a:graphicData>
-        </a:graphic>
-      </p:graphicFrame>
-      <p:sp>
-        <p:nvSpPr>
-          <p:cNvPr id="7" name="Marcador de posición de contenido 6"/>
-          <p:cNvSpPr>
-            <a:spLocks noGrp="1"/>
-          </p:cNvSpPr>
-          <p:nvPr>
-            <p:ph sz="half" idx="2"/>
-          </p:nvPr>
-        </p:nvSpPr>
-        <p:spPr/>
-        <p:txBody>
-          <a:bodyPr rtlCol="0"/>
-          <a:lstStyle/>
-          <a:p>
-            <a:pPr rtl="0"/>
-            <a:r>
-              <a:rPr lang="es-ES" dirty="0"/>
-              <a:t>Primera viñeta aquí</a:t>
-            </a:r>
-          </a:p>
-          <a:p>
-            <a:pPr rtl="0"/>
-            <a:r>
-              <a:rPr lang="es-ES" dirty="0"/>
-              <a:t>Segunda viñeta aquí</a:t>
-            </a:r>
-          </a:p>
-          <a:p>
-            <a:pPr rtl="0"/>
-            <a:r>
-              <a:rPr lang="es-ES" dirty="0"/>
-              <a:t>Tercera viñeta aquí</a:t>
-            </a:r>
-          </a:p>
-        </p:txBody>
-      </p:sp>
-      <p:sp>
-        <p:nvSpPr>
-          <p:cNvPr id="3" name="Marcador de pie de página 2">
-            <a:extLst>
-              <a:ext uri="{FF2B5EF4-FFF2-40B4-BE49-F238E27FC236}">
-                <a16:creationId xmlns:a16="http://schemas.microsoft.com/office/drawing/2014/main" id="{589E451B-1A91-445D-BF6B-781565BF6D4A}"/>
-              </a:ext>
-            </a:extLst>
-          </p:cNvPr>
-          <p:cNvSpPr>
-            <a:spLocks noGrp="1"/>
-          </p:cNvSpPr>
-          <p:nvPr>
-            <p:ph type="ftr" sz="quarter" idx="4294967295"/>
-          </p:nvPr>
-        </p:nvSpPr>
-        <p:spPr>
-          <a:xfrm>
-            <a:off x="6595933" y="6356351"/>
-            <a:ext cx="3974065" cy="365125"/>
-          </a:xfrm>
-        </p:spPr>
-        <p:txBody>
-          <a:bodyPr/>
-          <a:lstStyle/>
-          <a:p>
-            <a:pPr rtl="0"/>
-            <a:r>
-              <a:rPr lang="es-ES" noProof="0"/>
-              <a:t>Agregar un pie de página</a:t>
-            </a:r>
-            <a:endParaRPr lang="es-ES" noProof="0" dirty="0"/>
-          </a:p>
-        </p:txBody>
-      </p:sp>
-      <p:sp>
-        <p:nvSpPr>
-          <p:cNvPr id="4" name="Marcador de número de diapositiva 3">
-            <a:extLst>
-              <a:ext uri="{FF2B5EF4-FFF2-40B4-BE49-F238E27FC236}">
-                <a16:creationId xmlns:a16="http://schemas.microsoft.com/office/drawing/2014/main" id="{4590DC53-CB48-4CAC-B507-F6D5107FBF12}"/>
-              </a:ext>
-            </a:extLst>
-          </p:cNvPr>
-          <p:cNvSpPr>
-            <a:spLocks noGrp="1"/>
-          </p:cNvSpPr>
-          <p:nvPr>
-            <p:ph type="sldNum" sz="quarter" idx="12"/>
-          </p:nvPr>
-        </p:nvSpPr>
-        <p:spPr/>
-        <p:txBody>
-          <a:bodyPr/>
-          <a:lstStyle/>
-          <a:p>
-            <a:pPr rtl="0"/>
-            <a:fld id="{7DC1BBB0-96F0-4077-A278-0F3FB5C104D3}" type="slidenum">
-              <a:rPr lang="es-ES" noProof="0" smtClean="0"/>
-              <a:t>8</a:t>
-            </a:fld>
-            <a:endParaRPr lang="es-ES" noProof="0" dirty="0"/>
-          </a:p>
-        </p:txBody>
-      </p:sp>
-    </p:spTree>
-    <p:extLst>
-      <p:ext uri="{BB962C8B-B14F-4D97-AF65-F5344CB8AC3E}">
-        <p14:creationId xmlns:p14="http://schemas.microsoft.com/office/powerpoint/2010/main" val="513726968"/>
       </p:ext>
     </p:extLst>
   </p:cSld>
@@ -17049,19 +18629,44 @@
             <a:pPr rtl="0"/>
             <a:r>
               <a:rPr lang="es-ES" dirty="0"/>
-              <a:t>Agregar un título de diapositiva (1)</a:t>
+              <a:t>Diseño de dos objetos con SmartArt</a:t>
             </a:r>
           </a:p>
         </p:txBody>
       </p:sp>
-      <p:sp>
-        <p:nvSpPr>
-          <p:cNvPr id="5" name="Marcador de posición de texto 4"/>
+      <p:graphicFrame>
+        <p:nvGraphicFramePr>
+          <p:cNvPr id="6" name="Marcador de posición de contenido 5" descr="Diagrama de lista vertical con botón de contenido adicional en el que se muestran tres grupos organizados uno debajo del otro con viñetas que indican las tareas de cada grupo."/>
+          <p:cNvGraphicFramePr>
+            <a:graphicFrameLocks noGrp="1"/>
+          </p:cNvGraphicFramePr>
+          <p:nvPr>
+            <p:ph sz="half" idx="1"/>
+            <p:extLst>
+              <p:ext uri="{D42A27DB-BD31-4B8C-83A1-F6EECF244321}">
+                <p14:modId xmlns:p14="http://schemas.microsoft.com/office/powerpoint/2010/main" val="3959688702"/>
+              </p:ext>
+            </p:extLst>
+          </p:nvPr>
+        </p:nvGraphicFramePr>
+        <p:xfrm>
+          <a:off x="1593850" y="1600200"/>
+          <a:ext cx="4814888" cy="4572000"/>
+        </p:xfrm>
+        <a:graphic>
+          <a:graphicData uri="http://schemas.openxmlformats.org/drawingml/2006/diagram">
+            <dgm:relIds xmlns:dgm="http://schemas.openxmlformats.org/drawingml/2006/diagram" xmlns:r="http://schemas.openxmlformats.org/officeDocument/2006/relationships" r:dm="rId3" r:lo="rId4" r:qs="rId5" r:cs="rId6"/>
+          </a:graphicData>
+        </a:graphic>
+      </p:graphicFrame>
+      <p:sp>
+        <p:nvSpPr>
+          <p:cNvPr id="7" name="Marcador de posición de contenido 6"/>
           <p:cNvSpPr>
             <a:spLocks noGrp="1"/>
           </p:cNvSpPr>
           <p:nvPr>
-            <p:ph type="body" idx="1"/>
+            <p:ph sz="half" idx="2"/>
           </p:nvPr>
         </p:nvSpPr>
         <p:spPr/>
@@ -17070,7 +18675,24 @@
           <a:lstStyle/>
           <a:p>
             <a:pPr rtl="0"/>
-            <a:endParaRPr lang="es-ES" dirty="0"/>
+            <a:r>
+              <a:rPr lang="es-ES" dirty="0"/>
+              <a:t>Primera viñeta aquí</a:t>
+            </a:r>
+          </a:p>
+          <a:p>
+            <a:pPr rtl="0"/>
+            <a:r>
+              <a:rPr lang="es-ES" dirty="0"/>
+              <a:t>Segunda viñeta aquí</a:t>
+            </a:r>
+          </a:p>
+          <a:p>
+            <a:pPr rtl="0"/>
+            <a:r>
+              <a:rPr lang="es-ES" dirty="0"/>
+              <a:t>Tercera viñeta aquí</a:t>
+            </a:r>
           </a:p>
         </p:txBody>
       </p:sp>
@@ -17079,7 +18701,7 @@
           <p:cNvPr id="3" name="Marcador de pie de página 2">
             <a:extLst>
               <a:ext uri="{FF2B5EF4-FFF2-40B4-BE49-F238E27FC236}">
-                <a16:creationId xmlns:a16="http://schemas.microsoft.com/office/drawing/2014/main" id="{51A48A5E-C144-458C-902D-D0C3F769511E}"/>
+                <a16:creationId xmlns:a16="http://schemas.microsoft.com/office/drawing/2014/main" id="{589E451B-1A91-445D-BF6B-781565BF6D4A}"/>
               </a:ext>
             </a:extLst>
           </p:cNvPr>
@@ -17092,7 +18714,7 @@
         </p:nvSpPr>
         <p:spPr>
           <a:xfrm>
-            <a:off x="6595933" y="6378799"/>
+            <a:off x="6595933" y="6356351"/>
             <a:ext cx="3974065" cy="365125"/>
           </a:xfrm>
         </p:spPr>
@@ -17114,7 +18736,7 @@
           <p:cNvPr id="4" name="Marcador de número de diapositiva 3">
             <a:extLst>
               <a:ext uri="{FF2B5EF4-FFF2-40B4-BE49-F238E27FC236}">
-                <a16:creationId xmlns:a16="http://schemas.microsoft.com/office/drawing/2014/main" id="{B883489B-C3C3-4CA7-ACA5-8594BFAFF488}"/>
+                <a16:creationId xmlns:a16="http://schemas.microsoft.com/office/drawing/2014/main" id="{4590DC53-CB48-4CAC-B507-F6D5107FBF12}"/>
               </a:ext>
             </a:extLst>
           </p:cNvPr>
@@ -17122,15 +18744,10 @@
             <a:spLocks noGrp="1"/>
           </p:cNvSpPr>
           <p:nvPr>
-            <p:ph type="sldNum" sz="quarter" idx="4294967295"/>
+            <p:ph type="sldNum" sz="quarter" idx="12"/>
           </p:nvPr>
         </p:nvSpPr>
-        <p:spPr>
-          <a:xfrm>
-            <a:off x="10666571" y="6378799"/>
-            <a:ext cx="609441" cy="365125"/>
-          </a:xfrm>
-        </p:spPr>
+        <p:spPr/>
         <p:txBody>
           <a:bodyPr/>
           <a:lstStyle/>
@@ -17138,7 +18755,6 @@
             <a:pPr rtl="0"/>
             <a:fld id="{7DC1BBB0-96F0-4077-A278-0F3FB5C104D3}" type="slidenum">
               <a:rPr lang="es-ES" noProof="0" smtClean="0"/>
-              <a:pPr rtl="0"/>
               <a:t>9</a:t>
             </a:fld>
             <a:endParaRPr lang="es-ES" noProof="0" dirty="0"/>
@@ -17148,7 +18764,7 @@
     </p:spTree>
     <p:extLst>
       <p:ext uri="{BB962C8B-B14F-4D97-AF65-F5344CB8AC3E}">
-        <p14:creationId xmlns:p14="http://schemas.microsoft.com/office/powerpoint/2010/main" val="352090314"/>
+        <p14:creationId xmlns:p14="http://schemas.microsoft.com/office/powerpoint/2010/main" val="513726968"/>
       </p:ext>
     </p:extLst>
   </p:cSld>

</xml_diff>